<commit_message>
Changing the file names.
</commit_message>
<xml_diff>
--- a/Beta Regression/Beta-regression.pptx
+++ b/Beta Regression/Beta-regression.pptx
@@ -5,10 +5,10 @@
     <p:sldMasterId id="2147483648" r:id="rId1"/>
   </p:sldMasterIdLst>
   <p:notesMasterIdLst>
-    <p:notesMasterId r:id="rId20"/>
+    <p:notesMasterId r:id="rId22"/>
   </p:notesMasterIdLst>
   <p:handoutMasterIdLst>
-    <p:handoutMasterId r:id="rId21"/>
+    <p:handoutMasterId r:id="rId23"/>
   </p:handoutMasterIdLst>
   <p:sldIdLst>
     <p:sldId id="256" r:id="rId2"/>
@@ -16,19 +16,21 @@
     <p:sldId id="363" r:id="rId4"/>
     <p:sldId id="364" r:id="rId5"/>
     <p:sldId id="365" r:id="rId6"/>
-    <p:sldId id="366" r:id="rId7"/>
-    <p:sldId id="368" r:id="rId8"/>
+    <p:sldId id="379" r:id="rId7"/>
+    <p:sldId id="366" r:id="rId8"/>
     <p:sldId id="369" r:id="rId9"/>
-    <p:sldId id="370" r:id="rId10"/>
-    <p:sldId id="371" r:id="rId11"/>
-    <p:sldId id="372" r:id="rId12"/>
-    <p:sldId id="374" r:id="rId13"/>
-    <p:sldId id="373" r:id="rId14"/>
-    <p:sldId id="375" r:id="rId15"/>
-    <p:sldId id="376" r:id="rId16"/>
-    <p:sldId id="378" r:id="rId17"/>
-    <p:sldId id="377" r:id="rId18"/>
-    <p:sldId id="367" r:id="rId19"/>
+    <p:sldId id="368" r:id="rId10"/>
+    <p:sldId id="370" r:id="rId11"/>
+    <p:sldId id="371" r:id="rId12"/>
+    <p:sldId id="372" r:id="rId13"/>
+    <p:sldId id="374" r:id="rId14"/>
+    <p:sldId id="373" r:id="rId15"/>
+    <p:sldId id="375" r:id="rId16"/>
+    <p:sldId id="376" r:id="rId17"/>
+    <p:sldId id="378" r:id="rId18"/>
+    <p:sldId id="377" r:id="rId19"/>
+    <p:sldId id="380" r:id="rId20"/>
+    <p:sldId id="367" r:id="rId21"/>
   </p:sldIdLst>
   <p:sldSz cx="12192000" cy="6858000"/>
   <p:notesSz cx="6858000" cy="9144000"/>
@@ -979,8 +981,8 @@
         </a:p>
       </dgm:t>
     </dgm:pt>
-    <mc:AlternateContent xmlns:mc="http://schemas.openxmlformats.org/markup-compatibility/2006" xmlns:a14="http://schemas.microsoft.com/office/drawing/2010/main">
-      <mc:Choice Requires="a14">
+    <mc:AlternateContent xmlns:mc="http://schemas.openxmlformats.org/markup-compatibility/2006">
+      <mc:Choice xmlns:a14="http://schemas.microsoft.com/office/drawing/2010/main" Requires="a14">
         <dgm:pt modelId="{3A269D55-F454-4A81-BF6A-FD122A4A0195}">
           <dgm:prSet/>
           <dgm:spPr/>
@@ -1027,7 +1029,7 @@
                     <a:schemeClr val="tx1"/>
                   </a:solidFill>
                 </a:rPr>
-                <a:t>a, b) or Y </a:t>
+                <a:t>a, b) ~ Y </a:t>
               </a:r>
               <a14:m>
                 <m:oMath xmlns:m="http://schemas.openxmlformats.org/officeDocument/2006/math">
@@ -1059,13 +1061,66 @@
                     <a:schemeClr val="tx1"/>
                   </a:solidFill>
                 </a:rPr>
-                <a:t>0, 1)</a:t>
+                <a:t>0, 1) </a:t>
+              </a:r>
+              <a:br>
+                <a:rPr lang="en-GB" dirty="0">
+                  <a:solidFill>
+                    <a:schemeClr val="tx1"/>
+                  </a:solidFill>
+                </a:rPr>
+              </a:br>
+              <a:r>
+                <a:rPr lang="en-GB" dirty="0">
+                  <a:solidFill>
+                    <a:schemeClr val="tx1"/>
+                  </a:solidFill>
+                </a:rPr>
+                <a:t>(or Y </a:t>
+              </a:r>
+              <a14:m>
+                <m:oMath xmlns:m="http://schemas.openxmlformats.org/officeDocument/2006/math">
+                  <m:r>
+                    <a:rPr lang="en-GB" i="1" smtClean="0">
+                      <a:solidFill>
+                        <a:schemeClr val="tx1"/>
+                      </a:solidFill>
+                      <a:latin typeface="Cambria Math" panose="02040503050406030204" pitchFamily="18" charset="0"/>
+                      <a:ea typeface="Cambria Math" panose="02040503050406030204" pitchFamily="18" charset="0"/>
+                    </a:rPr>
+                    <m:t>∈</m:t>
+                  </m:r>
+                </m:oMath>
+              </a14:m>
+              <a:r>
+                <a:rPr lang="en-GB" dirty="0">
+                  <a:solidFill>
+                    <a:schemeClr val="tx1"/>
+                  </a:solidFill>
+                </a:rPr>
+                <a:t> [</a:t>
+              </a:r>
+              <a:r>
+                <a:rPr lang="en-GB" dirty="0" err="1">
+                  <a:solidFill>
+                    <a:schemeClr val="tx1"/>
+                  </a:solidFill>
+                </a:rPr>
+                <a:t>a,b</a:t>
+              </a:r>
+              <a:r>
+                <a:rPr lang="en-GB" dirty="0">
+                  <a:solidFill>
+                    <a:schemeClr val="tx1"/>
+                  </a:solidFill>
+                </a:rPr>
+                <a:t>]) </a:t>
               </a:r>
             </a:p>
           </dgm:t>
         </dgm:pt>
       </mc:Choice>
-      <mc:Fallback xmlns="">
+      <mc:Fallback>
         <dgm:pt modelId="{3A269D55-F454-4A81-BF6A-FD122A4A0195}">
           <dgm:prSet/>
           <dgm:spPr/>
@@ -1108,7 +1163,7 @@
                     <a:schemeClr val="tx1"/>
                   </a:solidFill>
                 </a:rPr>
-                <a:t>a, b) or Y </a:t>
+                <a:t>a, b) ~ Y </a:t>
               </a:r>
               <a:r>
                 <a:rPr lang="en-GB" i="0">
@@ -1136,7 +1191,56 @@
                     <a:schemeClr val="tx1"/>
                   </a:solidFill>
                 </a:rPr>
-                <a:t>0, 1)</a:t>
+                <a:t>0, 1) </a:t>
+              </a:r>
+              <a:br>
+                <a:rPr lang="en-GB" dirty="0">
+                  <a:solidFill>
+                    <a:schemeClr val="tx1"/>
+                  </a:solidFill>
+                </a:rPr>
+              </a:br>
+              <a:r>
+                <a:rPr lang="en-GB" dirty="0">
+                  <a:solidFill>
+                    <a:schemeClr val="tx1"/>
+                  </a:solidFill>
+                </a:rPr>
+                <a:t>(or Y </a:t>
+              </a:r>
+              <a:r>
+                <a:rPr lang="en-GB" i="0">
+                  <a:solidFill>
+                    <a:schemeClr val="tx1"/>
+                  </a:solidFill>
+                  <a:latin typeface="Cambria Math" panose="02040503050406030204" pitchFamily="18" charset="0"/>
+                  <a:ea typeface="Cambria Math" panose="02040503050406030204" pitchFamily="18" charset="0"/>
+                </a:rPr>
+                <a:t>∈</a:t>
+              </a:r>
+              <a:r>
+                <a:rPr lang="en-GB" dirty="0">
+                  <a:solidFill>
+                    <a:schemeClr val="tx1"/>
+                  </a:solidFill>
+                </a:rPr>
+                <a:t> [</a:t>
+              </a:r>
+              <a:r>
+                <a:rPr lang="en-GB" dirty="0" err="1">
+                  <a:solidFill>
+                    <a:schemeClr val="tx1"/>
+                  </a:solidFill>
+                </a:rPr>
+                <a:t>a,b</a:t>
+              </a:r>
+              <a:r>
+                <a:rPr lang="en-GB" dirty="0">
+                  <a:solidFill>
+                    <a:schemeClr val="tx1"/>
+                  </a:solidFill>
+                </a:rPr>
+                <a:t>]) </a:t>
               </a:r>
             </a:p>
           </dgm:t>
@@ -1165,8 +1269,8 @@
         </a:p>
       </dgm:t>
     </dgm:pt>
-    <mc:AlternateContent xmlns:mc="http://schemas.openxmlformats.org/markup-compatibility/2006" xmlns:a14="http://schemas.microsoft.com/office/drawing/2010/main">
-      <mc:Choice Requires="a14">
+    <mc:AlternateContent xmlns:mc="http://schemas.openxmlformats.org/markup-compatibility/2006">
+      <mc:Choice xmlns:a14="http://schemas.microsoft.com/office/drawing/2010/main" Requires="a14">
         <dgm:pt modelId="{F49992F5-7F45-496E-8D76-95B668B93F4E}">
           <dgm:prSet/>
           <dgm:spPr/>
@@ -1215,7 +1319,7 @@
                     <a:rPr lang="en-GB" b="0" i="1" smtClean="0">
                       <a:latin typeface="Cambria Math" panose="02040503050406030204" pitchFamily="18" charset="0"/>
                     </a:rPr>
-                    <m:t>𝑔</m:t>
+                    <m:t>h</m:t>
                   </m:r>
                   <m:r>
                     <a:rPr lang="en-GB" b="0" i="1" smtClean="0">
@@ -1299,7 +1403,7 @@
           </dgm:t>
         </dgm:pt>
       </mc:Choice>
-      <mc:Fallback xmlns="">
+      <mc:Fallback>
         <dgm:pt modelId="{F49992F5-7F45-496E-8D76-95B668B93F4E}">
           <dgm:prSet/>
           <dgm:spPr/>
@@ -1334,7 +1438,7 @@
                 <a:rPr lang="en-GB" b="0" i="0">
                   <a:latin typeface="Cambria Math" panose="02040503050406030204" pitchFamily="18" charset="0"/>
                 </a:rPr>
-                <a:t>=  𝑔(𝑌)</a:t>
+                <a:t>=  ℎ(𝑌)</a:t>
               </a:r>
               <a:r>
                 <a:rPr lang="en-US" dirty="0"/>
@@ -1612,7 +1716,7 @@
         <a:blipFill>
           <a:blip xmlns:r="http://schemas.openxmlformats.org/officeDocument/2006/relationships" r:embed="rId1"/>
           <a:stretch>
-            <a:fillRect/>
+            <a:fillRect t="-3226" b="-9677"/>
           </a:stretch>
         </a:blipFill>
       </dgm:spPr>
@@ -2047,7 +2151,7 @@
                 <a:schemeClr val="tx1"/>
               </a:solidFill>
             </a:rPr>
-            <a:t>a, b) or Y </a:t>
+            <a:t>a, b) ~ Y </a:t>
           </a:r>
           <a14:m xmlns:a14="http://schemas.microsoft.com/office/drawing/2010/main">
             <m:oMath xmlns:m="http://schemas.openxmlformats.org/officeDocument/2006/math">
@@ -2079,7 +2183,60 @@
                 <a:schemeClr val="tx1"/>
               </a:solidFill>
             </a:rPr>
-            <a:t>0, 1)</a:t>
+            <a:t>0, 1) </a:t>
+          </a:r>
+          <a:br>
+            <a:rPr lang="en-GB" sz="3100" kern="1200" dirty="0">
+              <a:solidFill>
+                <a:schemeClr val="tx1"/>
+              </a:solidFill>
+            </a:rPr>
+          </a:br>
+          <a:r>
+            <a:rPr lang="en-GB" sz="3100" kern="1200" dirty="0">
+              <a:solidFill>
+                <a:schemeClr val="tx1"/>
+              </a:solidFill>
+            </a:rPr>
+            <a:t>(or Y </a:t>
+          </a:r>
+          <a14:m xmlns:a14="http://schemas.microsoft.com/office/drawing/2010/main">
+            <m:oMath xmlns:m="http://schemas.openxmlformats.org/officeDocument/2006/math">
+              <m:r>
+                <a:rPr lang="en-GB" sz="3100" i="1" kern="1200" smtClean="0">
+                  <a:solidFill>
+                    <a:schemeClr val="tx1"/>
+                  </a:solidFill>
+                  <a:latin typeface="Cambria Math" panose="02040503050406030204" pitchFamily="18" charset="0"/>
+                  <a:ea typeface="Cambria Math" panose="02040503050406030204" pitchFamily="18" charset="0"/>
+                </a:rPr>
+                <m:t>∈</m:t>
+              </m:r>
+            </m:oMath>
+          </a14:m>
+          <a:r>
+            <a:rPr lang="en-GB" sz="3100" kern="1200" dirty="0">
+              <a:solidFill>
+                <a:schemeClr val="tx1"/>
+              </a:solidFill>
+            </a:rPr>
+            <a:t> [</a:t>
+          </a:r>
+          <a:r>
+            <a:rPr lang="en-GB" sz="3100" kern="1200" dirty="0" err="1">
+              <a:solidFill>
+                <a:schemeClr val="tx1"/>
+              </a:solidFill>
+            </a:rPr>
+            <a:t>a,b</a:t>
+          </a:r>
+          <a:r>
+            <a:rPr lang="en-GB" sz="3100" kern="1200" dirty="0">
+              <a:solidFill>
+                <a:schemeClr val="tx1"/>
+              </a:solidFill>
+            </a:rPr>
+            <a:t>]) </a:t>
           </a:r>
         </a:p>
       </dsp:txBody>
@@ -2259,7 +2416,7 @@
                 <a:rPr lang="en-GB" sz="3100" b="0" i="1" kern="1200" smtClean="0">
                   <a:latin typeface="Cambria Math" panose="02040503050406030204" pitchFamily="18" charset="0"/>
                 </a:rPr>
-                <m:t>𝑔</m:t>
+                <m:t>h</m:t>
               </m:r>
               <m:r>
                 <a:rPr lang="en-GB" sz="3100" b="0" i="1" kern="1200" smtClean="0">
@@ -4288,7 +4445,7 @@
           <a:p>
             <a:fld id="{696C064A-D61B-4B21-B757-51A9B82445B8}" type="datetimeFigureOut">
               <a:rPr lang="en-US" smtClean="0"/>
-              <a:t>5/28/2018</a:t>
+              <a:t>5/29/2018</a:t>
             </a:fld>
             <a:endParaRPr lang="en-US"/>
           </a:p>
@@ -4448,7 +4605,7 @@
           <a:p>
             <a:fld id="{3EFD42F7-718C-4B98-AAEC-167E6DDD60A7}" type="datetimeFigureOut">
               <a:rPr lang="en-US" smtClean="0"/>
-              <a:t>5/28/2018</a:t>
+              <a:t>5/29/2018</a:t>
             </a:fld>
             <a:endParaRPr lang="en-US"/>
           </a:p>
@@ -4755,131 +4912,72 @@
           <a:lstStyle/>
           <a:p>
             <a:r>
-              <a:rPr lang="en-GB" sz="1200" b="0" i="0" u="none" strike="noStrike" kern="1200" baseline="0" dirty="0">
+              <a:rPr lang="en-GB" sz="1200" b="0" i="0" kern="1200" dirty="0">
                 <a:solidFill>
                   <a:schemeClr val="tx1"/>
                 </a:solidFill>
+                <a:effectLst/>
                 <a:latin typeface="+mn-lt"/>
                 <a:ea typeface="+mn-ea"/>
                 <a:cs typeface="+mn-cs"/>
               </a:rPr>
-              <a:t>The main motivation for using a link function in the regression structure is twofold. </a:t>
-            </a:r>
-          </a:p>
-          <a:p>
-            <a:endParaRPr lang="en-GB" sz="1200" b="0" i="0" u="none" strike="noStrike" kern="1200" baseline="0" dirty="0">
-              <a:solidFill>
-                <a:schemeClr val="tx1"/>
-              </a:solidFill>
-              <a:latin typeface="+mn-lt"/>
-              <a:ea typeface="+mn-ea"/>
-              <a:cs typeface="+mn-cs"/>
-            </a:endParaRPr>
-          </a:p>
-          <a:p>
-            <a:r>
-              <a:rPr lang="en-GB" sz="1200" b="0" i="0" u="none" strike="noStrike" kern="1200" baseline="0" dirty="0">
+              <a:t>The limits of the logit scale are negative infinity and positive infinity. </a:t>
+            </a:r>
+          </a:p>
+          <a:p>
+            <a:r>
+              <a:rPr lang="en-GB" sz="1200" b="0" i="0" kern="1200" dirty="0">
                 <a:solidFill>
                   <a:schemeClr val="tx1"/>
                 </a:solidFill>
+                <a:effectLst/>
                 <a:latin typeface="+mn-lt"/>
                 <a:ea typeface="+mn-ea"/>
                 <a:cs typeface="+mn-cs"/>
               </a:rPr>
-              <a:t>First, both sides of the regression equation assume values in the real line when a link function is applied to </a:t>
-            </a:r>
-            <a:r>
-              <a:rPr lang="en-GB" sz="1200" b="0" i="0" u="none" strike="noStrike" kern="1200" baseline="0" dirty="0" err="1">
+              <a:t>This is particularly important where prediction is needed, as having a bounded scale could give nonsensical results (e.g., more than 100% or less than 0%).</a:t>
+            </a:r>
+          </a:p>
+          <a:p>
+            <a:r>
+              <a:rPr lang="en-GB" sz="1200" b="0" i="0" kern="1200" dirty="0">
                 <a:solidFill>
                   <a:schemeClr val="tx1"/>
                 </a:solidFill>
+                <a:effectLst/>
                 <a:latin typeface="+mn-lt"/>
                 <a:ea typeface="+mn-ea"/>
                 <a:cs typeface="+mn-cs"/>
               </a:rPr>
-              <a:t>i</a:t>
-            </a:r>
-            <a:r>
-              <a:rPr lang="en-GB" sz="1200" b="0" i="0" u="none" strike="noStrike" kern="1200" baseline="0" dirty="0">
+              <a:t>The logit scale is more intuitive since it is the log-odds. </a:t>
+            </a:r>
+          </a:p>
+          <a:p>
+            <a:r>
+              <a:rPr lang="en-GB" sz="1200" b="0" i="0" kern="1200" dirty="0">
                 <a:solidFill>
                   <a:schemeClr val="tx1"/>
                 </a:solidFill>
+                <a:effectLst/>
                 <a:latin typeface="+mn-lt"/>
                 <a:ea typeface="+mn-ea"/>
                 <a:cs typeface="+mn-cs"/>
               </a:rPr>
-              <a:t>. </a:t>
-            </a:r>
-          </a:p>
-          <a:p>
-            <a:r>
-              <a:rPr lang="en-GB" sz="1200" b="0" i="0" u="none" strike="noStrike" kern="1200" baseline="0" dirty="0">
+              <a:t>This is particularly useful in interpreting slopes from a logistic regression, in which the logit transformation is central.</a:t>
+            </a:r>
+          </a:p>
+          <a:p>
+            <a:r>
+              <a:rPr lang="en-GB" sz="1200" b="0" i="0" kern="1200" dirty="0">
                 <a:solidFill>
                   <a:schemeClr val="tx1"/>
                 </a:solidFill>
+                <a:effectLst/>
                 <a:latin typeface="+mn-lt"/>
                 <a:ea typeface="+mn-ea"/>
                 <a:cs typeface="+mn-cs"/>
               </a:rPr>
-              <a:t>Second, there is an added flexibility since the practitioner can choose the function that yields the best fit.</a:t>
-            </a:r>
-          </a:p>
-          <a:p>
-            <a:endParaRPr lang="en-GB" sz="1200" b="0" i="0" u="none" strike="noStrike" kern="1200" baseline="0" dirty="0">
-              <a:solidFill>
-                <a:schemeClr val="tx1"/>
-              </a:solidFill>
-              <a:latin typeface="+mn-lt"/>
-              <a:ea typeface="+mn-ea"/>
-              <a:cs typeface="+mn-cs"/>
-            </a:endParaRPr>
-          </a:p>
-          <a:p>
-            <a:r>
-              <a:rPr lang="en-GB" sz="1200" b="0" i="0" u="none" strike="noStrike" kern="1200" baseline="0" dirty="0">
-                <a:solidFill>
-                  <a:schemeClr val="tx1"/>
-                </a:solidFill>
-                <a:latin typeface="+mn-lt"/>
-                <a:ea typeface="+mn-ea"/>
-                <a:cs typeface="+mn-cs"/>
-              </a:rPr>
-              <a:t>log, logit , </a:t>
-            </a:r>
-            <a:r>
-              <a:rPr lang="en-GB" sz="1200" b="0" i="0" u="none" strike="noStrike" kern="1200" baseline="0" dirty="0" err="1">
-                <a:solidFill>
-                  <a:schemeClr val="tx1"/>
-                </a:solidFill>
-                <a:latin typeface="+mn-lt"/>
-                <a:ea typeface="+mn-ea"/>
-                <a:cs typeface="+mn-cs"/>
-              </a:rPr>
-              <a:t>probit</a:t>
-            </a:r>
-            <a:r>
-              <a:rPr lang="en-GB" sz="1200" b="0" i="0" u="none" strike="noStrike" kern="1200" baseline="0" dirty="0">
-                <a:solidFill>
-                  <a:schemeClr val="tx1"/>
-                </a:solidFill>
-                <a:latin typeface="+mn-lt"/>
-                <a:ea typeface="+mn-ea"/>
-                <a:cs typeface="+mn-cs"/>
-              </a:rPr>
-              <a:t> , complementary log-log, log-log and Cauchy for the mean</a:t>
-            </a:r>
-          </a:p>
-          <a:p>
-            <a:r>
-              <a:rPr lang="en-GB" sz="1200" b="0" i="0" u="none" strike="noStrike" kern="1200" baseline="0" dirty="0">
-                <a:solidFill>
-                  <a:schemeClr val="tx1"/>
-                </a:solidFill>
-                <a:latin typeface="+mn-lt"/>
-                <a:ea typeface="+mn-ea"/>
-                <a:cs typeface="+mn-cs"/>
-              </a:rPr>
-              <a:t>"identity", "log", and "sqrt“ for the precision.</a:t>
+              <a:t>Third, the logit scale correctly models the relationship between the mean and variance in binomial data, where variance is p(1-p)/n. </a:t>
             </a:r>
             <a:endParaRPr lang="en-GB" dirty="0"/>
           </a:p>
@@ -4902,7 +5000,7 @@
           <a:p>
             <a:fld id="{21B2AA4F-B828-4D7C-AFD3-893933DAFCB4}" type="slidenum">
               <a:rPr lang="en-US" smtClean="0"/>
-              <a:t>8</a:t>
+              <a:t>6</a:t>
             </a:fld>
             <a:endParaRPr lang="en-US"/>
           </a:p>
@@ -4911,7 +5009,7 @@
     </p:spTree>
     <p:extLst>
       <p:ext uri="{BB962C8B-B14F-4D97-AF65-F5344CB8AC3E}">
-        <p14:creationId xmlns:p14="http://schemas.microsoft.com/office/powerpoint/2010/main" val="2322010850"/>
+        <p14:creationId xmlns:p14="http://schemas.microsoft.com/office/powerpoint/2010/main" val="3008034766"/>
       </p:ext>
     </p:extLst>
   </p:cSld>
@@ -4965,6 +5063,133 @@
           <a:bodyPr/>
           <a:lstStyle/>
           <a:p>
+            <a:r>
+              <a:rPr lang="en-GB" sz="1200" b="0" i="0" u="none" strike="noStrike" kern="1200" baseline="0" dirty="0">
+                <a:solidFill>
+                  <a:schemeClr val="tx1"/>
+                </a:solidFill>
+                <a:latin typeface="+mn-lt"/>
+                <a:ea typeface="+mn-ea"/>
+                <a:cs typeface="+mn-cs"/>
+              </a:rPr>
+              <a:t>The main motivation for using a link function in the regression structure is twofold. </a:t>
+            </a:r>
+          </a:p>
+          <a:p>
+            <a:endParaRPr lang="en-GB" sz="1200" b="0" i="0" u="none" strike="noStrike" kern="1200" baseline="0" dirty="0">
+              <a:solidFill>
+                <a:schemeClr val="tx1"/>
+              </a:solidFill>
+              <a:latin typeface="+mn-lt"/>
+              <a:ea typeface="+mn-ea"/>
+              <a:cs typeface="+mn-cs"/>
+            </a:endParaRPr>
+          </a:p>
+          <a:p>
+            <a:r>
+              <a:rPr lang="en-GB" sz="1200" b="0" i="0" u="none" strike="noStrike" kern="1200" baseline="0" dirty="0">
+                <a:solidFill>
+                  <a:schemeClr val="tx1"/>
+                </a:solidFill>
+                <a:latin typeface="+mn-lt"/>
+                <a:ea typeface="+mn-ea"/>
+                <a:cs typeface="+mn-cs"/>
+              </a:rPr>
+              <a:t>First, both sides of the regression equation assume values in the real line when a link function is applied to </a:t>
+            </a:r>
+            <a:r>
+              <a:rPr lang="en-GB" sz="1200" b="0" i="0" u="none" strike="noStrike" kern="1200" baseline="0" dirty="0" err="1">
+                <a:solidFill>
+                  <a:schemeClr val="tx1"/>
+                </a:solidFill>
+                <a:latin typeface="+mn-lt"/>
+                <a:ea typeface="+mn-ea"/>
+                <a:cs typeface="+mn-cs"/>
+              </a:rPr>
+              <a:t>i</a:t>
+            </a:r>
+            <a:r>
+              <a:rPr lang="en-GB" sz="1200" b="0" i="0" u="none" strike="noStrike" kern="1200" baseline="0" dirty="0">
+                <a:solidFill>
+                  <a:schemeClr val="tx1"/>
+                </a:solidFill>
+                <a:latin typeface="+mn-lt"/>
+                <a:ea typeface="+mn-ea"/>
+                <a:cs typeface="+mn-cs"/>
+              </a:rPr>
+              <a:t>. </a:t>
+            </a:r>
+          </a:p>
+          <a:p>
+            <a:r>
+              <a:rPr lang="en-GB" sz="1200" b="0" i="0" u="none" strike="noStrike" kern="1200" baseline="0" dirty="0">
+                <a:solidFill>
+                  <a:schemeClr val="tx1"/>
+                </a:solidFill>
+                <a:latin typeface="+mn-lt"/>
+                <a:ea typeface="+mn-ea"/>
+                <a:cs typeface="+mn-cs"/>
+              </a:rPr>
+              <a:t>Second, there is an added flexibility since the practitioner can choose the function that yields the best fit.</a:t>
+            </a:r>
+          </a:p>
+          <a:p>
+            <a:endParaRPr lang="en-GB" sz="1200" b="0" i="0" u="none" strike="noStrike" kern="1200" baseline="0" dirty="0">
+              <a:solidFill>
+                <a:schemeClr val="tx1"/>
+              </a:solidFill>
+              <a:latin typeface="+mn-lt"/>
+              <a:ea typeface="+mn-ea"/>
+              <a:cs typeface="+mn-cs"/>
+            </a:endParaRPr>
+          </a:p>
+          <a:p>
+            <a:r>
+              <a:rPr lang="en-GB" sz="1200" b="0" i="0" u="none" strike="noStrike" kern="1200" baseline="0" dirty="0">
+                <a:solidFill>
+                  <a:schemeClr val="tx1"/>
+                </a:solidFill>
+                <a:latin typeface="+mn-lt"/>
+                <a:ea typeface="+mn-ea"/>
+                <a:cs typeface="+mn-cs"/>
+              </a:rPr>
+              <a:t>log, logit , </a:t>
+            </a:r>
+            <a:r>
+              <a:rPr lang="en-GB" sz="1200" b="0" i="0" u="none" strike="noStrike" kern="1200" baseline="0" dirty="0" err="1">
+                <a:solidFill>
+                  <a:schemeClr val="tx1"/>
+                </a:solidFill>
+                <a:latin typeface="+mn-lt"/>
+                <a:ea typeface="+mn-ea"/>
+                <a:cs typeface="+mn-cs"/>
+              </a:rPr>
+              <a:t>probit</a:t>
+            </a:r>
+            <a:r>
+              <a:rPr lang="en-GB" sz="1200" b="0" i="0" u="none" strike="noStrike" kern="1200" baseline="0" dirty="0">
+                <a:solidFill>
+                  <a:schemeClr val="tx1"/>
+                </a:solidFill>
+                <a:latin typeface="+mn-lt"/>
+                <a:ea typeface="+mn-ea"/>
+                <a:cs typeface="+mn-cs"/>
+              </a:rPr>
+              <a:t> , complementary log-log, log-log and Cauchy for the mean</a:t>
+            </a:r>
+          </a:p>
+          <a:p>
+            <a:r>
+              <a:rPr lang="en-GB" sz="1200" b="0" i="0" u="none" strike="noStrike" kern="1200" baseline="0" dirty="0">
+                <a:solidFill>
+                  <a:schemeClr val="tx1"/>
+                </a:solidFill>
+                <a:latin typeface="+mn-lt"/>
+                <a:ea typeface="+mn-ea"/>
+                <a:cs typeface="+mn-cs"/>
+              </a:rPr>
+              <a:t>"identity", "log", and "sqrt“ for the precision.</a:t>
+            </a:r>
             <a:endParaRPr lang="en-GB" dirty="0"/>
           </a:p>
         </p:txBody>
@@ -4986,7 +5211,91 @@
           <a:p>
             <a:fld id="{21B2AA4F-B828-4D7C-AFD3-893933DAFCB4}" type="slidenum">
               <a:rPr lang="en-US" smtClean="0"/>
-              <a:t>9</a:t>
+              <a:t>8</a:t>
+            </a:fld>
+            <a:endParaRPr lang="en-US"/>
+          </a:p>
+        </p:txBody>
+      </p:sp>
+    </p:spTree>
+    <p:extLst>
+      <p:ext uri="{BB962C8B-B14F-4D97-AF65-F5344CB8AC3E}">
+        <p14:creationId xmlns:p14="http://schemas.microsoft.com/office/powerpoint/2010/main" val="2322010850"/>
+      </p:ext>
+    </p:extLst>
+  </p:cSld>
+  <p:clrMapOvr>
+    <a:masterClrMapping/>
+  </p:clrMapOvr>
+</p:notes>
+</file>
+
+<file path=ppt/notesSlides/notesSlide3.xml><?xml version="1.0" encoding="utf-8"?>
+<p:notes xmlns:a="http://schemas.openxmlformats.org/drawingml/2006/main" xmlns:r="http://schemas.openxmlformats.org/officeDocument/2006/relationships" xmlns:p="http://schemas.openxmlformats.org/presentationml/2006/main">
+  <p:cSld>
+    <p:spTree>
+      <p:nvGrpSpPr>
+        <p:cNvPr id="1" name=""/>
+        <p:cNvGrpSpPr/>
+        <p:nvPr/>
+      </p:nvGrpSpPr>
+      <p:grpSpPr>
+        <a:xfrm>
+          <a:off x="0" y="0"/>
+          <a:ext cx="0" cy="0"/>
+          <a:chOff x="0" y="0"/>
+          <a:chExt cx="0" cy="0"/>
+        </a:xfrm>
+      </p:grpSpPr>
+      <p:sp>
+        <p:nvSpPr>
+          <p:cNvPr id="2" name="Slide Image Placeholder 1"/>
+          <p:cNvSpPr>
+            <a:spLocks noGrp="1" noRot="1" noChangeAspect="1"/>
+          </p:cNvSpPr>
+          <p:nvPr>
+            <p:ph type="sldImg"/>
+          </p:nvPr>
+        </p:nvSpPr>
+        <p:spPr/>
+      </p:sp>
+      <p:sp>
+        <p:nvSpPr>
+          <p:cNvPr id="3" name="Notes Placeholder 2"/>
+          <p:cNvSpPr>
+            <a:spLocks noGrp="1"/>
+          </p:cNvSpPr>
+          <p:nvPr>
+            <p:ph type="body" idx="1"/>
+          </p:nvPr>
+        </p:nvSpPr>
+        <p:spPr/>
+        <p:txBody>
+          <a:bodyPr/>
+          <a:lstStyle/>
+          <a:p>
+            <a:endParaRPr lang="en-GB" dirty="0"/>
+          </a:p>
+        </p:txBody>
+      </p:sp>
+      <p:sp>
+        <p:nvSpPr>
+          <p:cNvPr id="4" name="Slide Number Placeholder 3"/>
+          <p:cNvSpPr>
+            <a:spLocks noGrp="1"/>
+          </p:cNvSpPr>
+          <p:nvPr>
+            <p:ph type="sldNum" sz="quarter" idx="10"/>
+          </p:nvPr>
+        </p:nvSpPr>
+        <p:spPr/>
+        <p:txBody>
+          <a:bodyPr/>
+          <a:lstStyle/>
+          <a:p>
+            <a:fld id="{21B2AA4F-B828-4D7C-AFD3-893933DAFCB4}" type="slidenum">
+              <a:rPr lang="en-US" smtClean="0"/>
+              <a:t>10</a:t>
             </a:fld>
             <a:endParaRPr lang="en-US"/>
           </a:p>
@@ -17232,7 +17541,7 @@
                 </a:effectLst>
                 <a:sym typeface="+mn-ea"/>
               </a:rPr>
-              <a:t>How to analyse continuous bounded variables?</a:t>
+              <a:t>How to analyse bounded continuous outcomes?</a:t>
             </a:r>
             <a:endParaRPr lang="en-GB" sz="5400" b="1" spc="50" dirty="0">
               <a:ln w="9525" cmpd="sng">
@@ -17269,6 +17578,249 @@
 </file>
 
 <file path=ppt/slides/slide10.xml><?xml version="1.0" encoding="utf-8"?>
+<p:sld xmlns:a="http://schemas.openxmlformats.org/drawingml/2006/main" xmlns:r="http://schemas.openxmlformats.org/officeDocument/2006/relationships" xmlns:p="http://schemas.openxmlformats.org/presentationml/2006/main">
+  <p:cSld>
+    <p:spTree>
+      <p:nvGrpSpPr>
+        <p:cNvPr id="1" name=""/>
+        <p:cNvGrpSpPr/>
+        <p:nvPr/>
+      </p:nvGrpSpPr>
+      <p:grpSpPr>
+        <a:xfrm>
+          <a:off x="0" y="0"/>
+          <a:ext cx="0" cy="0"/>
+          <a:chOff x="0" y="0"/>
+          <a:chExt cx="0" cy="0"/>
+        </a:xfrm>
+      </p:grpSpPr>
+      <p:sp>
+        <p:nvSpPr>
+          <p:cNvPr id="2" name="Title 1">
+            <a:extLst>
+              <a:ext uri="{FF2B5EF4-FFF2-40B4-BE49-F238E27FC236}">
+                <a16:creationId xmlns:a16="http://schemas.microsoft.com/office/drawing/2014/main" id="{78FEEEAD-80C1-4393-89D7-B4F4543E4551}"/>
+              </a:ext>
+            </a:extLst>
+          </p:cNvPr>
+          <p:cNvSpPr>
+            <a:spLocks noGrp="1"/>
+          </p:cNvSpPr>
+          <p:nvPr>
+            <p:ph type="title"/>
+          </p:nvPr>
+        </p:nvSpPr>
+        <p:spPr>
+          <a:xfrm>
+            <a:off x="696912" y="116632"/>
+            <a:ext cx="10798175" cy="533400"/>
+          </a:xfrm>
+        </p:spPr>
+        <p:txBody>
+          <a:bodyPr/>
+          <a:lstStyle/>
+          <a:p>
+            <a:pPr algn="ctr"/>
+            <a:r>
+              <a:rPr lang="en-GB" b="0" dirty="0"/>
+              <a:t>Implementation in R</a:t>
+            </a:r>
+            <a:endParaRPr lang="en-GB" dirty="0"/>
+          </a:p>
+        </p:txBody>
+      </p:sp>
+      <p:sp>
+        <p:nvSpPr>
+          <p:cNvPr id="3" name="Content Placeholder 2">
+            <a:extLst>
+              <a:ext uri="{FF2B5EF4-FFF2-40B4-BE49-F238E27FC236}">
+                <a16:creationId xmlns:a16="http://schemas.microsoft.com/office/drawing/2014/main" id="{38FC01DC-960B-4FC5-8DA0-762FBF5E96DE}"/>
+              </a:ext>
+            </a:extLst>
+          </p:cNvPr>
+          <p:cNvSpPr>
+            <a:spLocks noGrp="1"/>
+          </p:cNvSpPr>
+          <p:nvPr>
+            <p:ph idx="1"/>
+          </p:nvPr>
+        </p:nvSpPr>
+        <p:spPr>
+          <a:xfrm>
+            <a:off x="696913" y="650032"/>
+            <a:ext cx="10798173" cy="5290393"/>
+          </a:xfrm>
+        </p:spPr>
+        <p:txBody>
+          <a:bodyPr/>
+          <a:lstStyle/>
+          <a:p>
+            <a:r>
+              <a:rPr lang="en-GB" dirty="0"/>
+              <a:t>The function used is </a:t>
+            </a:r>
+            <a:r>
+              <a:rPr lang="en-GB" dirty="0" err="1"/>
+              <a:t>betareg</a:t>
+            </a:r>
+            <a:r>
+              <a:rPr lang="en-GB" dirty="0"/>
+              <a:t>()</a:t>
+            </a:r>
+          </a:p>
+          <a:p>
+            <a:r>
+              <a:rPr lang="en-GB" dirty="0"/>
+              <a:t>Similar to the </a:t>
+            </a:r>
+            <a:r>
+              <a:rPr lang="en-GB" dirty="0" err="1"/>
+              <a:t>glm</a:t>
+            </a:r>
+            <a:r>
+              <a:rPr lang="en-GB" dirty="0"/>
+              <a:t>() function.</a:t>
+            </a:r>
+          </a:p>
+          <a:p>
+            <a:pPr lvl="1"/>
+            <a:r>
+              <a:rPr lang="en-GB" dirty="0"/>
+              <a:t>A main difference is that two equations may be calculated (one for mean and  one for precision) </a:t>
+            </a:r>
+          </a:p>
+          <a:p>
+            <a:pPr marL="321945" lvl="1" indent="0" algn="ctr">
+              <a:buNone/>
+            </a:pPr>
+            <a:r>
+              <a:rPr lang="en-GB" dirty="0"/>
+              <a:t>formula = </a:t>
+            </a:r>
+            <a:r>
+              <a:rPr lang="pl-PL" dirty="0"/>
+              <a:t>y ~ x1 + x2 | z1 + z2 + z3</a:t>
+            </a:r>
+            <a:endParaRPr lang="en-GB" dirty="0"/>
+          </a:p>
+          <a:p>
+            <a:pPr marL="321945" lvl="1" indent="0" algn="ctr">
+              <a:buNone/>
+            </a:pPr>
+            <a:r>
+              <a:rPr lang="en-GB" dirty="0"/>
+              <a:t>In the above example the x</a:t>
+            </a:r>
+            <a:r>
+              <a:rPr lang="en-GB" baseline="-25000" dirty="0"/>
+              <a:t>1</a:t>
+            </a:r>
+            <a:r>
+              <a:rPr lang="en-GB" dirty="0"/>
+              <a:t> + x</a:t>
+            </a:r>
+            <a:r>
+              <a:rPr lang="en-GB" baseline="-25000" dirty="0"/>
+              <a:t>2</a:t>
+            </a:r>
+            <a:r>
+              <a:rPr lang="en-GB" dirty="0"/>
+              <a:t> are the regressors for mean  modelling </a:t>
+            </a:r>
+            <a:r>
+              <a:rPr lang="en-GB" dirty="0">
+                <a:hlinkClick r:id="rId3" action="ppaction://hlinksldjump"/>
+              </a:rPr>
+              <a:t>[eq.1]</a:t>
+            </a:r>
+            <a:endParaRPr lang="en-GB" dirty="0"/>
+          </a:p>
+          <a:p>
+            <a:pPr marL="321945" lvl="1" indent="0" algn="ctr">
+              <a:buNone/>
+            </a:pPr>
+            <a:r>
+              <a:rPr lang="en-GB" dirty="0"/>
+              <a:t>While the </a:t>
+            </a:r>
+            <a:r>
+              <a:rPr lang="pl-PL" dirty="0"/>
+              <a:t>z</a:t>
+            </a:r>
+            <a:r>
+              <a:rPr lang="pl-PL" baseline="-25000" dirty="0"/>
+              <a:t>1</a:t>
+            </a:r>
+            <a:r>
+              <a:rPr lang="pl-PL" dirty="0"/>
+              <a:t> + z</a:t>
+            </a:r>
+            <a:r>
+              <a:rPr lang="pl-PL" baseline="-25000" dirty="0"/>
+              <a:t>2</a:t>
+            </a:r>
+            <a:r>
+              <a:rPr lang="pl-PL" dirty="0"/>
+              <a:t> + z</a:t>
+            </a:r>
+            <a:r>
+              <a:rPr lang="pl-PL" baseline="-25000" dirty="0"/>
+              <a:t>3</a:t>
+            </a:r>
+            <a:r>
+              <a:rPr lang="en-GB" dirty="0"/>
+              <a:t> are the regressors for the precision equation </a:t>
+            </a:r>
+            <a:r>
+              <a:rPr lang="en-GB" dirty="0">
+                <a:hlinkClick r:id="rId3" action="ppaction://hlinksldjump"/>
+              </a:rPr>
+              <a:t>[eq.2]</a:t>
+            </a:r>
+            <a:endParaRPr lang="en-GB" dirty="0"/>
+          </a:p>
+          <a:p>
+            <a:pPr marL="321945" lvl="1" indent="0" algn="ctr">
+              <a:buNone/>
+            </a:pPr>
+            <a:endParaRPr lang="en-GB" baseline="-25000" dirty="0"/>
+          </a:p>
+          <a:p>
+            <a:pPr marL="321945" lvl="1" indent="0" algn="ctr">
+              <a:buNone/>
+            </a:pPr>
+            <a:r>
+              <a:rPr lang="en-GB" dirty="0"/>
+              <a:t>formula = </a:t>
+            </a:r>
+            <a:r>
+              <a:rPr lang="pl-PL" dirty="0"/>
+              <a:t>y ~ x1 + x2</a:t>
+            </a:r>
+            <a:endParaRPr lang="en-GB" dirty="0"/>
+          </a:p>
+          <a:p>
+            <a:pPr marL="321945" lvl="1" indent="0" algn="ctr">
+              <a:buNone/>
+            </a:pPr>
+            <a:endParaRPr lang="en-GB" dirty="0"/>
+          </a:p>
+        </p:txBody>
+      </p:sp>
+    </p:spTree>
+    <p:extLst>
+      <p:ext uri="{BB962C8B-B14F-4D97-AF65-F5344CB8AC3E}">
+        <p14:creationId xmlns:p14="http://schemas.microsoft.com/office/powerpoint/2010/main" val="2928120243"/>
+      </p:ext>
+    </p:extLst>
+  </p:cSld>
+  <p:clrMapOvr>
+    <a:masterClrMapping/>
+  </p:clrMapOvr>
+</p:sld>
+</file>
+
+<file path=ppt/slides/slide11.xml><?xml version="1.0" encoding="utf-8"?>
 <p:sld xmlns:a="http://schemas.openxmlformats.org/drawingml/2006/main" xmlns:r="http://schemas.openxmlformats.org/officeDocument/2006/relationships" xmlns:p="http://schemas.openxmlformats.org/presentationml/2006/main">
   <p:cSld>
     <p:spTree>
@@ -17336,7 +17888,7 @@
 </p:sld>
 </file>
 
-<file path=ppt/slides/slide11.xml><?xml version="1.0" encoding="utf-8"?>
+<file path=ppt/slides/slide12.xml><?xml version="1.0" encoding="utf-8"?>
 <p:sld xmlns:a="http://schemas.openxmlformats.org/drawingml/2006/main" xmlns:r="http://schemas.openxmlformats.org/officeDocument/2006/relationships" xmlns:p="http://schemas.openxmlformats.org/presentationml/2006/main">
   <p:cSld>
     <p:spTree>
@@ -17688,7 +18240,7 @@
 </p:sld>
 </file>
 
-<file path=ppt/slides/slide12.xml><?xml version="1.0" encoding="utf-8"?>
+<file path=ppt/slides/slide13.xml><?xml version="1.0" encoding="utf-8"?>
 <p:sld xmlns:a="http://schemas.openxmlformats.org/drawingml/2006/main" xmlns:r="http://schemas.openxmlformats.org/officeDocument/2006/relationships" xmlns:p="http://schemas.openxmlformats.org/presentationml/2006/main">
   <p:cSld>
     <p:spTree>
@@ -17972,7 +18524,7 @@
 </p:sld>
 </file>
 
-<file path=ppt/slides/slide13.xml><?xml version="1.0" encoding="utf-8"?>
+<file path=ppt/slides/slide14.xml><?xml version="1.0" encoding="utf-8"?>
 <p:sld xmlns:a="http://schemas.openxmlformats.org/drawingml/2006/main" xmlns:r="http://schemas.openxmlformats.org/officeDocument/2006/relationships" xmlns:p="http://schemas.openxmlformats.org/presentationml/2006/main">
   <p:cSld>
     <p:spTree>
@@ -18065,7 +18617,7 @@
 </p:sld>
 </file>
 
-<file path=ppt/slides/slide14.xml><?xml version="1.0" encoding="utf-8"?>
+<file path=ppt/slides/slide15.xml><?xml version="1.0" encoding="utf-8"?>
 <p:sld xmlns:a="http://schemas.openxmlformats.org/drawingml/2006/main" xmlns:r="http://schemas.openxmlformats.org/officeDocument/2006/relationships" xmlns:p="http://schemas.openxmlformats.org/presentationml/2006/main">
   <p:cSld>
     <p:spTree>
@@ -18221,7 +18773,7 @@
 </p:sld>
 </file>
 
-<file path=ppt/slides/slide15.xml><?xml version="1.0" encoding="utf-8"?>
+<file path=ppt/slides/slide16.xml><?xml version="1.0" encoding="utf-8"?>
 <p:sld xmlns:a="http://schemas.openxmlformats.org/drawingml/2006/main" xmlns:r="http://schemas.openxmlformats.org/officeDocument/2006/relationships" xmlns:p="http://schemas.openxmlformats.org/presentationml/2006/main">
   <p:cSld>
     <p:spTree>
@@ -18308,7 +18860,7 @@
             </a:r>
             <a:r>
               <a:rPr lang="en-GB" dirty="0"/>
-              <a:t> a modified </a:t>
+              <a:t> function a modified </a:t>
             </a:r>
             <a:r>
               <a:rPr lang="en-GB" dirty="0" err="1"/>
@@ -18326,6 +18878,40 @@
               <a:rPr lang="en-GB" dirty="0"/>
               <a:t> package. </a:t>
             </a:r>
+            <a:r>
+              <a:rPr lang="en-GB" dirty="0">
+                <a:hlinkClick r:id="rId2" action="ppaction://hlinksldjump"/>
+              </a:rPr>
+              <a:t>Zeileis A, </a:t>
+            </a:r>
+            <a:r>
+              <a:rPr lang="en-GB" dirty="0" err="1">
+                <a:hlinkClick r:id="rId2" action="ppaction://hlinksldjump"/>
+              </a:rPr>
+              <a:t>Hothorn</a:t>
+            </a:r>
+            <a:r>
+              <a:rPr lang="en-GB" dirty="0">
+                <a:hlinkClick r:id="rId2" action="ppaction://hlinksldjump"/>
+              </a:rPr>
+              <a:t> T, </a:t>
+            </a:r>
+            <a:r>
+              <a:rPr lang="en-GB" dirty="0" err="1">
+                <a:hlinkClick r:id="rId2" action="ppaction://hlinksldjump"/>
+              </a:rPr>
+              <a:t>Hornik</a:t>
+            </a:r>
+            <a:r>
+              <a:rPr lang="en-GB" dirty="0">
+                <a:hlinkClick r:id="rId2" action="ppaction://hlinksldjump"/>
+              </a:rPr>
+              <a:t> K (2008)</a:t>
+            </a:r>
+            <a:endParaRPr lang="en-GB" dirty="0"/>
+          </a:p>
+          <a:p>
+            <a:endParaRPr lang="en-GB" dirty="0"/>
           </a:p>
           <a:p>
             <a:endParaRPr lang="en-GB" dirty="0"/>
@@ -18391,7 +18977,7 @@
 </p:sld>
 </file>
 
-<file path=ppt/slides/slide16.xml><?xml version="1.0" encoding="utf-8"?>
+<file path=ppt/slides/slide17.xml><?xml version="1.0" encoding="utf-8"?>
 <p:sld xmlns:a="http://schemas.openxmlformats.org/drawingml/2006/main" xmlns:r="http://schemas.openxmlformats.org/officeDocument/2006/relationships" xmlns:p="http://schemas.openxmlformats.org/presentationml/2006/main">
   <p:cSld>
     <p:spTree>
@@ -18457,16 +19043,15 @@
           </p:cNvPicPr>
           <p:nvPr/>
         </p:nvPicPr>
-        <p:blipFill>
+        <p:blipFill rotWithShape="1">
           <a:blip r:embed="rId2"/>
-          <a:stretch>
-            <a:fillRect/>
-          </a:stretch>
+          <a:srcRect t="8607" b="2898"/>
+          <a:stretch/>
         </p:blipFill>
         <p:spPr>
           <a:xfrm>
-            <a:off x="1218777" y="906561"/>
-            <a:ext cx="9754445" cy="5044877"/>
+            <a:off x="696913" y="1052736"/>
+            <a:ext cx="10855753" cy="4968552"/>
           </a:xfrm>
           <a:prstGeom prst="rect">
             <a:avLst/>
@@ -18486,7 +19071,7 @@
 </p:sld>
 </file>
 
-<file path=ppt/slides/slide17.xml><?xml version="1.0" encoding="utf-8"?>
+<file path=ppt/slides/slide18.xml><?xml version="1.0" encoding="utf-8"?>
 <p:sld xmlns:a="http://schemas.openxmlformats.org/drawingml/2006/main" xmlns:r="http://schemas.openxmlformats.org/officeDocument/2006/relationships" xmlns:p="http://schemas.openxmlformats.org/presentationml/2006/main">
   <p:cSld>
     <p:spTree>
@@ -18555,8 +19140,8 @@
         </p:nvSpPr>
         <p:spPr>
           <a:xfrm>
-            <a:off x="696913" y="980728"/>
-            <a:ext cx="10798175" cy="4959697"/>
+            <a:off x="696250" y="670914"/>
+            <a:ext cx="10798175" cy="813421"/>
           </a:xfrm>
         </p:spPr>
         <p:txBody>
@@ -18565,16 +19150,47 @@
           <a:p>
             <a:r>
               <a:rPr lang="en-GB" dirty="0"/>
-              <a:t>If we didn’t know dyslexia and we were suspecting underlying latent classes</a:t>
-            </a:r>
-            <a:r>
-              <a:rPr lang="el-GR" dirty="0"/>
-              <a:t> </a:t>
-            </a:r>
-            <a:endParaRPr lang="en-GB" dirty="0"/>
+              <a:t>No dyslexia information available. </a:t>
+            </a:r>
+            <a:endParaRPr lang="el-GR" dirty="0"/>
+          </a:p>
+          <a:p>
+            <a:r>
+              <a:rPr lang="en-GB" dirty="0"/>
+              <a:t>Look for k = 3 clusters  with at least a component for ideal score of 0.99</a:t>
+            </a:r>
           </a:p>
         </p:txBody>
       </p:sp>
+      <p:pic>
+        <p:nvPicPr>
+          <p:cNvPr id="5" name="Picture 4">
+            <a:extLst>
+              <a:ext uri="{FF2B5EF4-FFF2-40B4-BE49-F238E27FC236}">
+                <a16:creationId xmlns:a16="http://schemas.microsoft.com/office/drawing/2014/main" id="{9ECE46B5-F5C1-4CDB-89F4-B0B3E7CCBCA3}"/>
+              </a:ext>
+            </a:extLst>
+          </p:cNvPr>
+          <p:cNvPicPr>
+            <a:picLocks noChangeAspect="1"/>
+          </p:cNvPicPr>
+          <p:nvPr/>
+        </p:nvPicPr>
+        <p:blipFill rotWithShape="1">
+          <a:blip r:embed="rId2"/>
+          <a:srcRect l="7" t="5176" r="2010" b="3382"/>
+          <a:stretch/>
+        </p:blipFill>
+        <p:spPr>
+          <a:xfrm>
+            <a:off x="696250" y="1505218"/>
+            <a:ext cx="11036455" cy="4724202"/>
+          </a:xfrm>
+          <a:prstGeom prst="rect">
+            <a:avLst/>
+          </a:prstGeom>
+        </p:spPr>
+      </p:pic>
     </p:spTree>
     <p:extLst>
       <p:ext uri="{BB962C8B-B14F-4D97-AF65-F5344CB8AC3E}">
@@ -18588,7 +19204,7 @@
 </p:sld>
 </file>
 
-<file path=ppt/slides/slide18.xml><?xml version="1.0" encoding="utf-8"?>
+<file path=ppt/slides/slide19.xml><?xml version="1.0" encoding="utf-8"?>
 <p:sld xmlns:a="http://schemas.openxmlformats.org/drawingml/2006/main" xmlns:r="http://schemas.openxmlformats.org/officeDocument/2006/relationships" xmlns:p="http://schemas.openxmlformats.org/presentationml/2006/main">
   <p:cSld>
     <p:spTree>
@@ -18610,7 +19226,7 @@
           <p:cNvPr id="2" name="Title 1">
             <a:extLst>
               <a:ext uri="{FF2B5EF4-FFF2-40B4-BE49-F238E27FC236}">
-                <a16:creationId xmlns:a16="http://schemas.microsoft.com/office/drawing/2014/main" id="{526A43FC-FE6B-41A3-8859-FFACA03D8E58}"/>
+                <a16:creationId xmlns:a16="http://schemas.microsoft.com/office/drawing/2014/main" id="{1E84508E-AD1F-42AA-B26E-92531F103A7E}"/>
               </a:ext>
             </a:extLst>
           </p:cNvPr>
@@ -18634,98 +19250,270 @@
             <a:pPr algn="ctr"/>
             <a:r>
               <a:rPr lang="en-GB" dirty="0"/>
-              <a:t>References</a:t>
+              <a:t>Finally</a:t>
             </a:r>
           </a:p>
         </p:txBody>
       </p:sp>
-      <p:sp>
-        <p:nvSpPr>
-          <p:cNvPr id="3" name="Content Placeholder 2">
+      <mc:AlternateContent xmlns:mc="http://schemas.openxmlformats.org/markup-compatibility/2006">
+        <mc:Choice xmlns:a14="http://schemas.microsoft.com/office/drawing/2010/main" Requires="a14">
+          <p:sp>
+            <p:nvSpPr>
+              <p:cNvPr id="3" name="Content Placeholder 2">
+                <a:extLst>
+                  <a:ext uri="{FF2B5EF4-FFF2-40B4-BE49-F238E27FC236}">
+                    <a16:creationId xmlns:a16="http://schemas.microsoft.com/office/drawing/2014/main" id="{7699F71F-4628-4F88-867F-8B0DC45E1606}"/>
+                  </a:ext>
+                </a:extLst>
+              </p:cNvPr>
+              <p:cNvSpPr>
+                <a:spLocks noGrp="1"/>
+              </p:cNvSpPr>
+              <p:nvPr>
+                <p:ph idx="1"/>
+              </p:nvPr>
+            </p:nvSpPr>
+            <p:spPr>
+              <a:xfrm>
+                <a:off x="696913" y="836712"/>
+                <a:ext cx="5687119" cy="5103713"/>
+              </a:xfrm>
+            </p:spPr>
+            <p:txBody>
+              <a:bodyPr/>
+              <a:lstStyle/>
+              <a:p>
+                <a:r>
+                  <a:rPr lang="en-GB" dirty="0"/>
+                  <a:t>If Y is </a:t>
+                </a:r>
+                <a14:m>
+                  <m:oMath xmlns:m="http://schemas.openxmlformats.org/officeDocument/2006/math">
+                    <m:r>
+                      <a:rPr lang="en-GB" i="1">
+                        <a:latin typeface="Cambria Math" panose="02040503050406030204" pitchFamily="18" charset="0"/>
+                        <a:ea typeface="Cambria Math" panose="02040503050406030204" pitchFamily="18" charset="0"/>
+                      </a:rPr>
+                      <m:t>∈</m:t>
+                    </m:r>
+                    <m:r>
+                      <a:rPr lang="en-GB" b="0" i="1" smtClean="0">
+                        <a:latin typeface="Cambria Math" panose="02040503050406030204" pitchFamily="18" charset="0"/>
+                        <a:ea typeface="Cambria Math" panose="02040503050406030204" pitchFamily="18" charset="0"/>
+                      </a:rPr>
+                      <m:t> </m:t>
+                    </m:r>
+                  </m:oMath>
+                </a14:m>
+                <a:r>
+                  <a:rPr lang="el-GR" dirty="0"/>
+                  <a:t> </a:t>
+                </a:r>
+                <a:r>
+                  <a:rPr lang="en-GB" dirty="0"/>
+                  <a:t>[</a:t>
+                </a:r>
+                <a:r>
+                  <a:rPr lang="en-GB" dirty="0" err="1"/>
+                  <a:t>a,b</a:t>
+                </a:r>
+                <a:r>
+                  <a:rPr lang="en-GB" dirty="0"/>
+                  <a:t>] we can :</a:t>
+                </a:r>
+              </a:p>
+              <a:p>
+                <a:pPr lvl="1"/>
+                <a:r>
+                  <a:rPr lang="en-GB" dirty="0"/>
+                  <a:t>use either the arcsine transformation [0,1] -&gt; [0,</a:t>
+                </a:r>
+                <a:r>
+                  <a:rPr lang="el-GR" dirty="0"/>
+                  <a:t>π]</a:t>
+                </a:r>
+                <a:endParaRPr lang="en-GB" dirty="0"/>
+              </a:p>
+              <a:p>
+                <a:pPr lvl="1"/>
+                <a:r>
+                  <a:rPr lang="en-GB" dirty="0"/>
+                  <a:t>We can subtract to the ones and add to the zeros a random small number </a:t>
+                </a:r>
+              </a:p>
+              <a:p>
+                <a:pPr lvl="1"/>
+                <a:endParaRPr lang="en-GB" dirty="0"/>
+              </a:p>
+              <a:p>
+                <a:r>
+                  <a:rPr lang="en-GB" dirty="0"/>
+                  <a:t>Or we can use the </a:t>
+                </a:r>
+                <a:r>
+                  <a:rPr lang="en-GB" dirty="0" err="1"/>
+                  <a:t>zoib</a:t>
+                </a:r>
+                <a:r>
+                  <a:rPr lang="en-GB" dirty="0"/>
+                  <a:t> package</a:t>
+                </a:r>
+              </a:p>
+              <a:p>
+                <a:r>
+                  <a:rPr lang="en-GB" dirty="0"/>
+                  <a:t>The Y is assumed to follow a piecewise distribution</a:t>
+                </a:r>
+              </a:p>
+              <a:p>
+                <a:r>
+                  <a:rPr lang="en-GB"/>
+                  <a:t>Bayesian </a:t>
+                </a:r>
+                <a:r>
+                  <a:rPr lang="en-GB" dirty="0"/>
+                  <a:t>inference with possibilities for :</a:t>
+                </a:r>
+              </a:p>
+              <a:p>
+                <a:pPr marL="782320" lvl="1" indent="-457200">
+                  <a:buFont typeface="+mj-lt"/>
+                  <a:buAutoNum type="arabicPeriod"/>
+                </a:pPr>
+                <a:r>
+                  <a:rPr lang="en-GB" dirty="0"/>
+                  <a:t>Repeated measures </a:t>
+                </a:r>
+              </a:p>
+              <a:p>
+                <a:pPr marL="782320" lvl="1" indent="-457200">
+                  <a:buFont typeface="+mj-lt"/>
+                  <a:buAutoNum type="arabicPeriod"/>
+                </a:pPr>
+                <a:r>
+                  <a:rPr lang="en-GB" dirty="0"/>
+                  <a:t>Fixed and random effect beta regression </a:t>
+                </a:r>
+              </a:p>
+              <a:p>
+                <a:pPr marL="782320" lvl="1" indent="-457200">
+                  <a:buFont typeface="+mj-lt"/>
+                  <a:buAutoNum type="arabicPeriod"/>
+                </a:pPr>
+                <a:r>
+                  <a:rPr lang="en-GB" dirty="0"/>
+                  <a:t>Clustered zero-inflated beta regression</a:t>
+                </a:r>
+              </a:p>
+              <a:p>
+                <a:pPr marL="782320" lvl="1" indent="-457200">
+                  <a:buFont typeface="+mj-lt"/>
+                  <a:buAutoNum type="arabicPeriod"/>
+                </a:pPr>
+                <a:endParaRPr lang="en-GB" dirty="0"/>
+              </a:p>
+              <a:p>
+                <a:pPr marL="782320" lvl="1" indent="-457200">
+                  <a:buFont typeface="+mj-lt"/>
+                  <a:buAutoNum type="arabicPeriod"/>
+                </a:pPr>
+                <a:endParaRPr lang="en-GB" dirty="0"/>
+              </a:p>
+              <a:p>
+                <a:pPr marL="325120" lvl="1" indent="0">
+                  <a:buNone/>
+                </a:pPr>
+                <a:r>
+                  <a:rPr lang="en-GB" dirty="0"/>
+                  <a:t>Unfortunately it was still on the 36%</a:t>
+                </a:r>
+              </a:p>
+            </p:txBody>
+          </p:sp>
+        </mc:Choice>
+        <mc:Fallback>
+          <p:sp>
+            <p:nvSpPr>
+              <p:cNvPr id="3" name="Content Placeholder 2">
+                <a:extLst>
+                  <a:ext uri="{FF2B5EF4-FFF2-40B4-BE49-F238E27FC236}">
+                    <a16:creationId xmlns:a16="http://schemas.microsoft.com/office/drawing/2014/main" id="{7699F71F-4628-4F88-867F-8B0DC45E1606}"/>
+                  </a:ext>
+                </a:extLst>
+              </p:cNvPr>
+              <p:cNvSpPr>
+                <a:spLocks noGrp="1" noRot="1" noChangeAspect="1" noMove="1" noResize="1" noEditPoints="1" noAdjustHandles="1" noChangeArrowheads="1" noChangeShapeType="1" noTextEdit="1"/>
+              </p:cNvSpPr>
+              <p:nvPr>
+                <p:ph idx="1"/>
+              </p:nvPr>
+            </p:nvSpPr>
+            <p:spPr>
+              <a:xfrm>
+                <a:off x="696913" y="836712"/>
+                <a:ext cx="5687119" cy="5103713"/>
+              </a:xfrm>
+              <a:blipFill>
+                <a:blip r:embed="rId2"/>
+                <a:stretch>
+                  <a:fillRect l="-2572" t="-1553" r="-750"/>
+                </a:stretch>
+              </a:blipFill>
+            </p:spPr>
+            <p:txBody>
+              <a:bodyPr/>
+              <a:lstStyle/>
+              <a:p>
+                <a:r>
+                  <a:rPr lang="en-GB">
+                    <a:noFill/>
+                  </a:rPr>
+                  <a:t> </a:t>
+                </a:r>
+              </a:p>
+            </p:txBody>
+          </p:sp>
+        </mc:Fallback>
+      </mc:AlternateContent>
+      <p:pic>
+        <p:nvPicPr>
+          <p:cNvPr id="5" name="Picture 4">
             <a:extLst>
               <a:ext uri="{FF2B5EF4-FFF2-40B4-BE49-F238E27FC236}">
-                <a16:creationId xmlns:a16="http://schemas.microsoft.com/office/drawing/2014/main" id="{1179A3D9-8917-493A-BB4B-CE49EDE8D5C1}"/>
+                <a16:creationId xmlns:a16="http://schemas.microsoft.com/office/drawing/2014/main" id="{7A5476BF-80DA-40A6-AD01-E1A74B1631A1}"/>
               </a:ext>
             </a:extLst>
           </p:cNvPr>
-          <p:cNvSpPr>
-            <a:spLocks noGrp="1"/>
-          </p:cNvSpPr>
-          <p:nvPr>
-            <p:ph idx="1"/>
-          </p:nvPr>
-        </p:nvSpPr>
+          <p:cNvPicPr>
+            <a:picLocks noChangeAspect="1"/>
+          </p:cNvPicPr>
+          <p:nvPr/>
+        </p:nvPicPr>
+        <p:blipFill rotWithShape="1">
+          <a:blip r:embed="rId3">
+            <a:extLst>
+              <a:ext uri="{28A0092B-C50C-407E-A947-70E740481C1C}">
+                <a14:useLocalDpi xmlns:a14="http://schemas.microsoft.com/office/drawing/2010/main" val="0"/>
+              </a:ext>
+            </a:extLst>
+          </a:blip>
+          <a:srcRect r="15960" b="3904"/>
+          <a:stretch/>
+        </p:blipFill>
         <p:spPr>
           <a:xfrm>
-            <a:off x="722022" y="1052736"/>
-            <a:ext cx="10798175" cy="4887689"/>
+            <a:off x="6888088" y="2797967"/>
+            <a:ext cx="4916947" cy="1135089"/>
           </a:xfrm>
+          <a:prstGeom prst="rect">
+            <a:avLst/>
+          </a:prstGeom>
         </p:spPr>
-        <p:txBody>
-          <a:bodyPr/>
-          <a:lstStyle/>
-          <a:p>
-            <a:r>
-              <a:rPr lang="en-GB" dirty="0"/>
-              <a:t>[1] Silvia Ferrari &amp; Francisco </a:t>
-            </a:r>
-            <a:r>
-              <a:rPr lang="en-GB" dirty="0" err="1"/>
-              <a:t>Cribari-Neto</a:t>
-            </a:r>
-            <a:r>
-              <a:rPr lang="en-GB" dirty="0"/>
-              <a:t> (2010) Beta Regression for Modelling Rates and Proportions, Journal of Applied Statistics, 31:7, 799-815, DOI: </a:t>
-            </a:r>
-            <a:r>
-              <a:rPr lang="en-GB" u="sng" dirty="0">
-                <a:hlinkClick r:id="rId2"/>
-              </a:rPr>
-              <a:t>10.1080/0266476042000214501</a:t>
-            </a:r>
-            <a:endParaRPr lang="en-GB" u="sng" dirty="0"/>
-          </a:p>
-          <a:p>
-            <a:r>
-              <a:rPr lang="en-GB" u="sng" dirty="0">
-                <a:hlinkClick r:id="rId3" action="ppaction://hlinksldjump"/>
-              </a:rPr>
-              <a:t>[2]</a:t>
-            </a:r>
-            <a:r>
-              <a:rPr lang="en-GB" dirty="0"/>
-              <a:t> </a:t>
-            </a:r>
-            <a:r>
-              <a:rPr lang="en-GB" dirty="0" err="1"/>
-              <a:t>Simas</a:t>
-            </a:r>
-            <a:r>
-              <a:rPr lang="en-GB" dirty="0"/>
-              <a:t>, Alexandre &amp; Barreto-Souza, Wagner &amp; V. Rocha, Andréa. (2010). Improved estimators for a general class of beta regression models. Computational Statistics &amp; Data Analysis. 54. 348-366. 10.1016/j.csda.2009.08.017. </a:t>
-            </a:r>
-          </a:p>
-          <a:p>
-            <a:r>
-              <a:rPr lang="en-GB" dirty="0"/>
-              <a:t>[3] Kosmidis I, Firth D (2010). \A Generic Algorithm for Reducing Bias in Parametric Estimation."</a:t>
-            </a:r>
-          </a:p>
-          <a:p>
-            <a:r>
-              <a:rPr lang="en-GB" dirty="0"/>
-              <a:t>Electronic Journal of Statistics, 4, 1097{1112.</a:t>
-            </a:r>
-          </a:p>
-          <a:p>
-            <a:endParaRPr lang="en-GB" dirty="0"/>
-          </a:p>
-        </p:txBody>
-      </p:sp>
+      </p:pic>
     </p:spTree>
     <p:extLst>
       <p:ext uri="{BB962C8B-B14F-4D97-AF65-F5344CB8AC3E}">
-        <p14:creationId xmlns:p14="http://schemas.microsoft.com/office/powerpoint/2010/main" val="946694180"/>
+        <p14:creationId xmlns:p14="http://schemas.microsoft.com/office/powerpoint/2010/main" val="4113211514"/>
       </p:ext>
     </p:extLst>
   </p:cSld>
@@ -18881,8 +19669,8 @@
           </a:p>
         </p:txBody>
       </p:sp>
-      <mc:AlternateContent xmlns:mc="http://schemas.openxmlformats.org/markup-compatibility/2006" xmlns:a14="http://schemas.microsoft.com/office/drawing/2010/main">
-        <mc:Choice Requires="a14">
+      <mc:AlternateContent xmlns:mc="http://schemas.openxmlformats.org/markup-compatibility/2006">
+        <mc:Choice xmlns:a14="http://schemas.microsoft.com/office/drawing/2010/main" Requires="a14">
           <p:graphicFrame>
             <p:nvGraphicFramePr>
               <p:cNvPr id="16" name="Content Placeholder 2"/>
@@ -18893,7 +19681,7 @@
                 <p:ph idx="1"/>
                 <p:extLst>
                   <p:ext uri="{D42A27DB-BD31-4B8C-83A1-F6EECF244321}">
-                    <p14:modId xmlns:p14="http://schemas.microsoft.com/office/powerpoint/2010/main" val="3996741360"/>
+                    <p14:modId xmlns:p14="http://schemas.microsoft.com/office/powerpoint/2010/main" val="2831219140"/>
                   </p:ext>
                 </p:extLst>
               </p:nvPr>
@@ -18909,7 +19697,7 @@
             </a:graphic>
           </p:graphicFrame>
         </mc:Choice>
-        <mc:Fallback xmlns="">
+        <mc:Fallback>
           <p:graphicFrame>
             <p:nvGraphicFramePr>
               <p:cNvPr id="16" name="Content Placeholder 2"/>
@@ -18920,7 +19708,7 @@
                 <p:ph idx="1"/>
                 <p:extLst>
                   <p:ext uri="{D42A27DB-BD31-4B8C-83A1-F6EECF244321}">
-                    <p14:modId xmlns:p14="http://schemas.microsoft.com/office/powerpoint/2010/main" val="3996741360"/>
+                    <p14:modId xmlns:p14="http://schemas.microsoft.com/office/powerpoint/2010/main" val="2831219140"/>
                   </p:ext>
                 </p:extLst>
               </p:nvPr>
@@ -18931,13 +19719,241 @@
             </p:xfrm>
             <a:graphic>
               <a:graphicData uri="http://schemas.openxmlformats.org/drawingml/2006/diagram">
-                <dgm:relIds xmlns:dgm="http://schemas.openxmlformats.org/drawingml/2006/diagram" xmlns:r="http://schemas.openxmlformats.org/officeDocument/2006/relationships" r:dm="rId7" r:lo="rId8" r:qs="rId9" r:cs="rId10"/>
+                <dgm:relIds xmlns:dgm="http://schemas.openxmlformats.org/drawingml/2006/diagram" xmlns:r="http://schemas.openxmlformats.org/officeDocument/2006/relationships" r:dm="rId7" r:lo="rId3" r:qs="rId4" r:cs="rId5"/>
               </a:graphicData>
             </a:graphic>
           </p:graphicFrame>
         </mc:Fallback>
       </mc:AlternateContent>
     </p:spTree>
+  </p:cSld>
+  <p:clrMapOvr>
+    <a:masterClrMapping/>
+  </p:clrMapOvr>
+</p:sld>
+</file>
+
+<file path=ppt/slides/slide20.xml><?xml version="1.0" encoding="utf-8"?>
+<p:sld xmlns:a="http://schemas.openxmlformats.org/drawingml/2006/main" xmlns:r="http://schemas.openxmlformats.org/officeDocument/2006/relationships" xmlns:p="http://schemas.openxmlformats.org/presentationml/2006/main">
+  <p:cSld>
+    <p:spTree>
+      <p:nvGrpSpPr>
+        <p:cNvPr id="1" name=""/>
+        <p:cNvGrpSpPr/>
+        <p:nvPr/>
+      </p:nvGrpSpPr>
+      <p:grpSpPr>
+        <a:xfrm>
+          <a:off x="0" y="0"/>
+          <a:ext cx="0" cy="0"/>
+          <a:chOff x="0" y="0"/>
+          <a:chExt cx="0" cy="0"/>
+        </a:xfrm>
+      </p:grpSpPr>
+      <p:sp>
+        <p:nvSpPr>
+          <p:cNvPr id="2" name="Title 1">
+            <a:extLst>
+              <a:ext uri="{FF2B5EF4-FFF2-40B4-BE49-F238E27FC236}">
+                <a16:creationId xmlns:a16="http://schemas.microsoft.com/office/drawing/2014/main" id="{526A43FC-FE6B-41A3-8859-FFACA03D8E58}"/>
+              </a:ext>
+            </a:extLst>
+          </p:cNvPr>
+          <p:cNvSpPr>
+            <a:spLocks noGrp="1"/>
+          </p:cNvSpPr>
+          <p:nvPr>
+            <p:ph type="title"/>
+          </p:nvPr>
+        </p:nvSpPr>
+        <p:spPr>
+          <a:xfrm>
+            <a:off x="696913" y="116632"/>
+            <a:ext cx="10798175" cy="533400"/>
+          </a:xfrm>
+        </p:spPr>
+        <p:txBody>
+          <a:bodyPr/>
+          <a:lstStyle/>
+          <a:p>
+            <a:pPr algn="ctr"/>
+            <a:r>
+              <a:rPr lang="en-GB" dirty="0"/>
+              <a:t>References</a:t>
+            </a:r>
+          </a:p>
+        </p:txBody>
+      </p:sp>
+      <p:sp>
+        <p:nvSpPr>
+          <p:cNvPr id="3" name="Content Placeholder 2">
+            <a:extLst>
+              <a:ext uri="{FF2B5EF4-FFF2-40B4-BE49-F238E27FC236}">
+                <a16:creationId xmlns:a16="http://schemas.microsoft.com/office/drawing/2014/main" id="{1179A3D9-8917-493A-BB4B-CE49EDE8D5C1}"/>
+              </a:ext>
+            </a:extLst>
+          </p:cNvPr>
+          <p:cNvSpPr>
+            <a:spLocks noGrp="1"/>
+          </p:cNvSpPr>
+          <p:nvPr>
+            <p:ph idx="1"/>
+          </p:nvPr>
+        </p:nvSpPr>
+        <p:spPr>
+          <a:xfrm>
+            <a:off x="722022" y="1052736"/>
+            <a:ext cx="10798175" cy="4887689"/>
+          </a:xfrm>
+        </p:spPr>
+        <p:txBody>
+          <a:bodyPr/>
+          <a:lstStyle/>
+          <a:p>
+            <a:r>
+              <a:rPr lang="en-GB" dirty="0">
+                <a:hlinkClick r:id="rId2" action="ppaction://hlinksldjump"/>
+              </a:rPr>
+              <a:t>[1]</a:t>
+            </a:r>
+            <a:r>
+              <a:rPr lang="en-GB" dirty="0"/>
+              <a:t> Warton, D.I., and F.K.C. Hui. 2011. The arcsine is asinine: the analysis of proportions in ecology. Ecology 92:3–10.</a:t>
+            </a:r>
+          </a:p>
+          <a:p>
+            <a:r>
+              <a:rPr lang="en-GB" dirty="0">
+                <a:hlinkClick r:id="rId2" action="ppaction://hlinksldjump"/>
+              </a:rPr>
+              <a:t>[2]</a:t>
+            </a:r>
+            <a:r>
+              <a:rPr lang="en-GB" dirty="0"/>
+              <a:t> Wilson, E., Underwood, M., </a:t>
+            </a:r>
+            <a:r>
+              <a:rPr lang="en-GB" dirty="0" err="1"/>
+              <a:t>Puckrin</a:t>
+            </a:r>
+            <a:r>
+              <a:rPr lang="en-GB" dirty="0"/>
+              <a:t>, O., </a:t>
+            </a:r>
+            <a:r>
+              <a:rPr lang="en-GB" dirty="0" err="1"/>
+              <a:t>Letto</a:t>
+            </a:r>
+            <a:r>
+              <a:rPr lang="en-GB" dirty="0"/>
+              <a:t>, K., Doyle, R., Caravan, H., Camus, S., &amp; Bassett, K. (2010). The Arcsine Transformation: Has the time come for retirement? </a:t>
+            </a:r>
+            <a:r>
+              <a:rPr lang="en-GB" dirty="0">
+                <a:hlinkClick r:id="rId3"/>
+              </a:rPr>
+              <a:t>http://www.mun.ca/biology/dschneider/b7932/B7932Final10Dec2010.pdf</a:t>
+            </a:r>
+            <a:endParaRPr lang="en-GB" dirty="0"/>
+          </a:p>
+          <a:p>
+            <a:r>
+              <a:rPr lang="en-GB" dirty="0">
+                <a:hlinkClick r:id="rId4" action="ppaction://hlinksldjump"/>
+              </a:rPr>
+              <a:t>[3]</a:t>
+            </a:r>
+            <a:r>
+              <a:rPr lang="en-GB" dirty="0"/>
+              <a:t> Silvia Ferrari &amp; Francisco </a:t>
+            </a:r>
+            <a:r>
+              <a:rPr lang="en-GB" dirty="0" err="1"/>
+              <a:t>Cribari-Neto</a:t>
+            </a:r>
+            <a:r>
+              <a:rPr lang="en-GB" dirty="0"/>
+              <a:t> (2010) Beta Regression for Modelling Rates and Proportions, Journal of Applied Statistics, 31:7, 799-815, DOI: </a:t>
+            </a:r>
+            <a:r>
+              <a:rPr lang="en-GB" u="sng" dirty="0">
+                <a:hlinkClick r:id="rId5"/>
+              </a:rPr>
+              <a:t>10.1080/0266476042000214501</a:t>
+            </a:r>
+            <a:endParaRPr lang="en-GB" u="sng" dirty="0"/>
+          </a:p>
+          <a:p>
+            <a:r>
+              <a:rPr lang="en-GB" u="sng" dirty="0">
+                <a:hlinkClick r:id="rId4" action="ppaction://hlinksldjump"/>
+              </a:rPr>
+              <a:t>[4]</a:t>
+            </a:r>
+            <a:r>
+              <a:rPr lang="en-GB" dirty="0"/>
+              <a:t> </a:t>
+            </a:r>
+            <a:r>
+              <a:rPr lang="en-GB" dirty="0" err="1"/>
+              <a:t>Simas</a:t>
+            </a:r>
+            <a:r>
+              <a:rPr lang="en-GB" dirty="0"/>
+              <a:t>, Alexandre &amp; Barreto-Souza, Wagner &amp; V. Rocha, Andréa. (2010). Improved estimators for a general class of beta regression models. Computational Statistics &amp; Data Analysis. 54. 348-366. 10.1016/j.csda.2009.08.017. </a:t>
+            </a:r>
+          </a:p>
+          <a:p>
+            <a:r>
+              <a:rPr lang="en-GB" dirty="0">
+                <a:hlinkClick r:id="rId6" action="ppaction://hlinksldjump"/>
+              </a:rPr>
+              <a:t>[5]</a:t>
+            </a:r>
+            <a:r>
+              <a:rPr lang="en-GB" dirty="0"/>
+              <a:t> Kosmidis I, Firth D (2010). \A Generic Algorithm for Reducing Bias in Parametric Estimation.“ Electronic Journal of Statistics, 4, 1097{1112.</a:t>
+            </a:r>
+          </a:p>
+          <a:p>
+            <a:r>
+              <a:rPr lang="en-GB" dirty="0">
+                <a:hlinkClick r:id="rId7" action="ppaction://hlinksldjump"/>
+              </a:rPr>
+              <a:t>[6]</a:t>
+            </a:r>
+            <a:r>
+              <a:rPr lang="en-GB" dirty="0"/>
+              <a:t> Zeileis A, </a:t>
+            </a:r>
+            <a:r>
+              <a:rPr lang="en-GB" dirty="0" err="1"/>
+              <a:t>Hothorn</a:t>
+            </a:r>
+            <a:r>
+              <a:rPr lang="en-GB" dirty="0"/>
+              <a:t> T, </a:t>
+            </a:r>
+            <a:r>
+              <a:rPr lang="en-GB" dirty="0" err="1"/>
+              <a:t>Hornik</a:t>
+            </a:r>
+            <a:r>
+              <a:rPr lang="en-GB" dirty="0"/>
+              <a:t> K (2008). “Model-Based Recursive Partitioning.” Journal of Computational and Graphical Statistics, 17(2), 492–514. doi:10.1198/106186008X319331</a:t>
+            </a:r>
+          </a:p>
+          <a:p>
+            <a:endParaRPr lang="en-GB" dirty="0"/>
+          </a:p>
+        </p:txBody>
+      </p:sp>
+    </p:spTree>
+    <p:extLst>
+      <p:ext uri="{BB962C8B-B14F-4D97-AF65-F5344CB8AC3E}">
+        <p14:creationId xmlns:p14="http://schemas.microsoft.com/office/powerpoint/2010/main" val="946694180"/>
+      </p:ext>
+    </p:extLst>
   </p:cSld>
   <p:clrMapOvr>
     <a:masterClrMapping/>
@@ -18996,8 +20012,8 @@
           </a:p>
         </p:txBody>
       </p:sp>
-      <mc:AlternateContent xmlns:mc="http://schemas.openxmlformats.org/markup-compatibility/2006" xmlns:a14="http://schemas.microsoft.com/office/drawing/2010/main">
-        <mc:Choice Requires="a14">
+      <mc:AlternateContent xmlns:mc="http://schemas.openxmlformats.org/markup-compatibility/2006">
+        <mc:Choice xmlns:a14="http://schemas.microsoft.com/office/drawing/2010/main" Requires="a14">
           <p:sp>
             <p:nvSpPr>
               <p:cNvPr id="3" name="Content Placeholder 2">
@@ -19031,6 +20047,10 @@
               </a:p>
               <a:p>
                 <a:pPr algn="ctr"/>
+                <a:r>
+                  <a:rPr lang="en-GB" dirty="0"/>
+                  <a:t>(2)*</a:t>
+                </a:r>
                 <a14:m>
                   <m:oMath xmlns:m="http://schemas.openxmlformats.org/officeDocument/2006/math">
                     <m:func>
@@ -19106,7 +20126,7 @@
             </p:txBody>
           </p:sp>
         </mc:Choice>
-        <mc:Fallback xmlns="">
+        <mc:Fallback>
           <p:sp>
             <p:nvSpPr>
               <p:cNvPr id="3" name="Content Placeholder 2">
@@ -19276,905 +20296,12 @@
           </a:prstGeom>
         </p:spPr>
       </p:pic>
-      <mc:AlternateContent xmlns:mc="http://schemas.openxmlformats.org/markup-compatibility/2006" xmlns:a14="http://schemas.microsoft.com/office/drawing/2010/main">
-        <mc:Choice Requires="a14">
-          <p:sp>
-            <p:nvSpPr>
-              <p:cNvPr id="5" name="Content Placeholder 2">
-                <a:extLst>
-                  <a:ext uri="{FF2B5EF4-FFF2-40B4-BE49-F238E27FC236}">
-                    <a16:creationId xmlns:a16="http://schemas.microsoft.com/office/drawing/2014/main" id="{64F90E9F-3916-4D26-A806-F073A689C3FE}"/>
-                  </a:ext>
-                </a:extLst>
-              </p:cNvPr>
-              <p:cNvSpPr txBox="1">
-                <a:spLocks/>
-              </p:cNvSpPr>
-              <p:nvPr/>
-            </p:nvSpPr>
-            <p:spPr bwMode="auto">
-              <a:xfrm>
-                <a:off x="551384" y="908720"/>
-                <a:ext cx="10943703" cy="1152128"/>
-              </a:xfrm>
-              <a:prstGeom prst="rect">
-                <a:avLst/>
-              </a:prstGeom>
-              <a:noFill/>
-              <a:ln>
-                <a:noFill/>
-              </a:ln>
-              <a:extLst>
-                <a:ext uri="{909E8E84-426E-40DD-AFC4-6F175D3DCCD1}">
-                  <a14:hiddenFill>
-                    <a:solidFill>
-                      <a:srgbClr val="FFFFFF"/>
-                    </a:solidFill>
-                  </a14:hiddenFill>
-                </a:ext>
-                <a:ext uri="{91240B29-F687-4F45-9708-019B960494DF}">
-                  <a14:hiddenLine w="9525">
-                    <a:solidFill>
-                      <a:srgbClr val="000000"/>
-                    </a:solidFill>
-                    <a:miter lim="800000"/>
-                    <a:headEnd/>
-                    <a:tailEnd/>
-                  </a14:hiddenLine>
-                </a:ext>
-              </a:extLst>
-            </p:spPr>
-            <p:txBody>
-              <a:bodyPr vert="horz" wrap="square" lIns="0" tIns="0" rIns="0" bIns="0" numCol="1" anchor="t" anchorCtr="0" compatLnSpc="1"/>
-              <a:lstStyle>
-                <a:lvl1pPr marL="322580" indent="-322580" algn="l" rtl="0" eaLnBrk="0" fontAlgn="base" hangingPunct="0">
-                  <a:lnSpc>
-                    <a:spcPts val="2500"/>
-                  </a:lnSpc>
-                  <a:spcBef>
-                    <a:spcPct val="0"/>
-                  </a:spcBef>
-                  <a:spcAft>
-                    <a:spcPct val="0"/>
-                  </a:spcAft>
-                  <a:buClr>
-                    <a:schemeClr val="tx2"/>
-                  </a:buClr>
-                  <a:buFont typeface="Arial" charset="0"/>
-                  <a:buChar char="•"/>
-                  <a:defRPr sz="2000" kern="1200">
-                    <a:solidFill>
-                      <a:schemeClr val="tx1"/>
-                    </a:solidFill>
-                    <a:latin typeface="+mn-lt"/>
-                    <a:ea typeface="+mn-ea"/>
-                    <a:cs typeface="+mn-cs"/>
-                  </a:defRPr>
-                </a:lvl1pPr>
-                <a:lvl2pPr marL="647700" indent="-325755" algn="l" rtl="0" eaLnBrk="0" fontAlgn="base" hangingPunct="0">
-                  <a:lnSpc>
-                    <a:spcPts val="2500"/>
-                  </a:lnSpc>
-                  <a:spcBef>
-                    <a:spcPct val="0"/>
-                  </a:spcBef>
-                  <a:spcAft>
-                    <a:spcPct val="0"/>
-                  </a:spcAft>
-                  <a:buFont typeface="Arial" charset="0"/>
-                  <a:buChar char="•"/>
-                  <a:defRPr sz="2000" kern="1200">
-                    <a:solidFill>
-                      <a:schemeClr val="tx1"/>
-                    </a:solidFill>
-                    <a:latin typeface="+mn-lt"/>
-                    <a:ea typeface="+mn-ea"/>
-                    <a:cs typeface="+mn-cs"/>
-                  </a:defRPr>
-                </a:lvl2pPr>
-                <a:lvl3pPr marL="970280" indent="-323850" algn="l" rtl="0" eaLnBrk="0" fontAlgn="base" hangingPunct="0">
-                  <a:lnSpc>
-                    <a:spcPts val="2500"/>
-                  </a:lnSpc>
-                  <a:spcBef>
-                    <a:spcPct val="0"/>
-                  </a:spcBef>
-                  <a:spcAft>
-                    <a:spcPct val="0"/>
-                  </a:spcAft>
-                  <a:buClr>
-                    <a:schemeClr val="tx2"/>
-                  </a:buClr>
-                  <a:buFont typeface="Arial" charset="0"/>
-                  <a:buChar char="•"/>
-                  <a:defRPr sz="2000" kern="1200">
-                    <a:solidFill>
-                      <a:schemeClr val="tx1"/>
-                    </a:solidFill>
-                    <a:latin typeface="+mn-lt"/>
-                    <a:ea typeface="+mn-ea"/>
-                    <a:cs typeface="+mn-cs"/>
-                  </a:defRPr>
-                </a:lvl3pPr>
-                <a:lvl4pPr marL="1294130" indent="-322580" algn="l" rtl="0" eaLnBrk="0" fontAlgn="base" hangingPunct="0">
-                  <a:lnSpc>
-                    <a:spcPts val="2500"/>
-                  </a:lnSpc>
-                  <a:spcBef>
-                    <a:spcPct val="0"/>
-                  </a:spcBef>
-                  <a:spcAft>
-                    <a:spcPct val="0"/>
-                  </a:spcAft>
-                  <a:buFont typeface="Arial" charset="0"/>
-                  <a:buChar char="•"/>
-                  <a:defRPr sz="2000" kern="1200">
-                    <a:solidFill>
-                      <a:schemeClr val="tx1"/>
-                    </a:solidFill>
-                    <a:latin typeface="+mn-lt"/>
-                    <a:ea typeface="+mn-ea"/>
-                    <a:cs typeface="+mn-cs"/>
-                  </a:defRPr>
-                </a:lvl4pPr>
-                <a:lvl5pPr marL="1619250" indent="-323850" algn="l" rtl="0" eaLnBrk="0" fontAlgn="base" hangingPunct="0">
-                  <a:lnSpc>
-                    <a:spcPts val="2500"/>
-                  </a:lnSpc>
-                  <a:spcBef>
-                    <a:spcPct val="0"/>
-                  </a:spcBef>
-                  <a:spcAft>
-                    <a:spcPct val="0"/>
-                  </a:spcAft>
-                  <a:buClr>
-                    <a:schemeClr val="tx2"/>
-                  </a:buClr>
-                  <a:buFont typeface="Arial" charset="0"/>
-                  <a:buChar char="•"/>
-                  <a:defRPr sz="2000" kern="1200">
-                    <a:solidFill>
-                      <a:schemeClr val="tx1"/>
-                    </a:solidFill>
-                    <a:latin typeface="+mn-lt"/>
-                    <a:ea typeface="+mn-ea"/>
-                    <a:cs typeface="+mn-cs"/>
-                  </a:defRPr>
-                </a:lvl5pPr>
-                <a:lvl6pPr marL="2514600" indent="-228600" algn="l" defTabSz="914400" rtl="0" eaLnBrk="1" latinLnBrk="0" hangingPunct="1">
-                  <a:spcBef>
-                    <a:spcPct val="20000"/>
-                  </a:spcBef>
-                  <a:buFont typeface="Arial" charset="0"/>
-                  <a:buChar char="•"/>
-                  <a:defRPr sz="2000" kern="1200">
-                    <a:solidFill>
-                      <a:schemeClr val="tx1"/>
-                    </a:solidFill>
-                    <a:latin typeface="+mn-lt"/>
-                    <a:ea typeface="+mn-ea"/>
-                    <a:cs typeface="+mn-cs"/>
-                  </a:defRPr>
-                </a:lvl6pPr>
-                <a:lvl7pPr marL="2971800" indent="-228600" algn="l" defTabSz="914400" rtl="0" eaLnBrk="1" latinLnBrk="0" hangingPunct="1">
-                  <a:spcBef>
-                    <a:spcPct val="20000"/>
-                  </a:spcBef>
-                  <a:buFont typeface="Arial" charset="0"/>
-                  <a:buChar char="•"/>
-                  <a:defRPr sz="2000" kern="1200">
-                    <a:solidFill>
-                      <a:schemeClr val="tx1"/>
-                    </a:solidFill>
-                    <a:latin typeface="+mn-lt"/>
-                    <a:ea typeface="+mn-ea"/>
-                    <a:cs typeface="+mn-cs"/>
-                  </a:defRPr>
-                </a:lvl7pPr>
-                <a:lvl8pPr marL="3429000" indent="-228600" algn="l" defTabSz="914400" rtl="0" eaLnBrk="1" latinLnBrk="0" hangingPunct="1">
-                  <a:spcBef>
-                    <a:spcPct val="20000"/>
-                  </a:spcBef>
-                  <a:buFont typeface="Arial" charset="0"/>
-                  <a:buChar char="•"/>
-                  <a:defRPr sz="2000" kern="1200">
-                    <a:solidFill>
-                      <a:schemeClr val="tx1"/>
-                    </a:solidFill>
-                    <a:latin typeface="+mn-lt"/>
-                    <a:ea typeface="+mn-ea"/>
-                    <a:cs typeface="+mn-cs"/>
-                  </a:defRPr>
-                </a:lvl8pPr>
-                <a:lvl9pPr marL="3886200" indent="-228600" algn="l" defTabSz="914400" rtl="0" eaLnBrk="1" latinLnBrk="0" hangingPunct="1">
-                  <a:spcBef>
-                    <a:spcPct val="20000"/>
-                  </a:spcBef>
-                  <a:buFont typeface="Arial" charset="0"/>
-                  <a:buChar char="•"/>
-                  <a:defRPr sz="2000" kern="1200">
-                    <a:solidFill>
-                      <a:schemeClr val="tx1"/>
-                    </a:solidFill>
-                    <a:latin typeface="+mn-lt"/>
-                    <a:ea typeface="+mn-ea"/>
-                    <a:cs typeface="+mn-cs"/>
-                  </a:defRPr>
-                </a:lvl9pPr>
-              </a:lstStyle>
-              <a:p>
-                <a:r>
-                  <a:rPr lang="en-GB" dirty="0"/>
-                  <a:t>Arcsine or arcsine-square root or angular transformation or  two times arcsine - square root </a:t>
-                </a:r>
-              </a:p>
-              <a:p>
-                <a:pPr algn="ctr"/>
-                <a14:m>
-                  <m:oMath xmlns:m="http://schemas.openxmlformats.org/officeDocument/2006/math">
-                    <m:func>
-                      <m:funcPr>
-                        <m:ctrlPr>
-                          <a:rPr lang="en-GB" i="1" smtClean="0">
-                            <a:latin typeface="Cambria Math" panose="02040503050406030204" pitchFamily="18" charset="0"/>
-                          </a:rPr>
-                        </m:ctrlPr>
-                      </m:funcPr>
-                      <m:fName>
-                        <m:sSup>
-                          <m:sSupPr>
-                            <m:ctrlPr>
-                              <a:rPr lang="en-GB" i="1" smtClean="0">
-                                <a:latin typeface="Cambria Math" panose="02040503050406030204" pitchFamily="18" charset="0"/>
-                              </a:rPr>
-                            </m:ctrlPr>
-                          </m:sSupPr>
-                          <m:e>
-                            <m:r>
-                              <m:rPr>
-                                <m:sty m:val="p"/>
-                              </m:rPr>
-                              <a:rPr lang="en-GB" smtClean="0">
-                                <a:latin typeface="Cambria Math" panose="02040503050406030204" pitchFamily="18" charset="0"/>
-                              </a:rPr>
-                              <m:t>sin</m:t>
-                            </m:r>
-                          </m:e>
-                          <m:sup>
-                            <m:r>
-                              <a:rPr lang="en-GB" i="1" smtClean="0">
-                                <a:latin typeface="Cambria Math" panose="02040503050406030204" pitchFamily="18" charset="0"/>
-                              </a:rPr>
-                              <m:t>−1</m:t>
-                            </m:r>
-                          </m:sup>
-                        </m:sSup>
-                      </m:fName>
-                      <m:e>
-                        <m:rad>
-                          <m:radPr>
-                            <m:degHide m:val="on"/>
-                            <m:ctrlPr>
-                              <a:rPr lang="en-GB" i="1" smtClean="0">
-                                <a:latin typeface="Cambria Math" panose="02040503050406030204" pitchFamily="18" charset="0"/>
-                              </a:rPr>
-                            </m:ctrlPr>
-                          </m:radPr>
-                          <m:deg/>
-                          <m:e>
-                            <m:r>
-                              <a:rPr lang="en-GB" i="1" smtClean="0">
-                                <a:latin typeface="Cambria Math" panose="02040503050406030204" pitchFamily="18" charset="0"/>
-                              </a:rPr>
-                              <m:t>𝑝</m:t>
-                            </m:r>
-                          </m:e>
-                        </m:rad>
-                      </m:e>
-                    </m:func>
-                  </m:oMath>
-                </a14:m>
-                <a:endParaRPr lang="en-GB" dirty="0"/>
-              </a:p>
-              <a:p>
-                <a:r>
-                  <a:rPr lang="en-GB" dirty="0"/>
-                  <a:t>The transformation pulls out the ends of the distribution more than the arcsine transformation</a:t>
-                </a:r>
-              </a:p>
-            </p:txBody>
-          </p:sp>
-        </mc:Choice>
-        <mc:Fallback xmlns="">
-          <p:sp>
-            <p:nvSpPr>
-              <p:cNvPr id="5" name="Content Placeholder 2">
-                <a:extLst>
-                  <a:ext uri="{FF2B5EF4-FFF2-40B4-BE49-F238E27FC236}">
-                    <a16:creationId xmlns:a16="http://schemas.microsoft.com/office/drawing/2014/main" id="{64F90E9F-3916-4D26-A806-F073A689C3FE}"/>
-                  </a:ext>
-                </a:extLst>
-              </p:cNvPr>
-              <p:cNvSpPr txBox="1">
-                <a:spLocks noRot="1" noChangeAspect="1" noMove="1" noResize="1" noEditPoints="1" noAdjustHandles="1" noChangeArrowheads="1" noChangeShapeType="1" noTextEdit="1"/>
-              </p:cNvSpPr>
-              <p:nvPr/>
-            </p:nvSpPr>
-            <p:spPr bwMode="auto">
-              <a:xfrm>
-                <a:off x="551384" y="908720"/>
-                <a:ext cx="10943703" cy="1152128"/>
-              </a:xfrm>
-              <a:prstGeom prst="rect">
-                <a:avLst/>
-              </a:prstGeom>
-              <a:blipFill>
-                <a:blip r:embed="rId3"/>
-                <a:stretch>
-                  <a:fillRect l="-1336" t="-6878"/>
-                </a:stretch>
-              </a:blipFill>
-              <a:ln>
-                <a:noFill/>
-              </a:ln>
-              <a:extLst>
-                <a:ext uri="{909E8E84-426E-40DD-AFC4-6F175D3DCCD1}">
-                  <a14:hiddenFill xmlns:a14="http://schemas.microsoft.com/office/drawing/2010/main">
-                    <a:solidFill>
-                      <a:srgbClr val="FFFFFF"/>
-                    </a:solidFill>
-                  </a14:hiddenFill>
-                </a:ext>
-                <a:ext uri="{91240B29-F687-4F45-9708-019B960494DF}">
-                  <a14:hiddenLine xmlns:a14="http://schemas.microsoft.com/office/drawing/2010/main" w="9525">
-                    <a:solidFill>
-                      <a:srgbClr val="000000"/>
-                    </a:solidFill>
-                    <a:miter lim="800000"/>
-                    <a:headEnd/>
-                    <a:tailEnd/>
-                  </a14:hiddenLine>
-                </a:ext>
-              </a:extLst>
-            </p:spPr>
-            <p:txBody>
-              <a:bodyPr/>
-              <a:lstStyle/>
-              <a:p>
-                <a:r>
-                  <a:rPr lang="en-GB">
-                    <a:noFill/>
-                  </a:rPr>
-                  <a:t> </a:t>
-                </a:r>
-              </a:p>
-            </p:txBody>
-          </p:sp>
-        </mc:Fallback>
-      </mc:AlternateContent>
-    </p:spTree>
-    <p:extLst>
-      <p:ext uri="{BB962C8B-B14F-4D97-AF65-F5344CB8AC3E}">
-        <p14:creationId xmlns:p14="http://schemas.microsoft.com/office/powerpoint/2010/main" val="3854208231"/>
-      </p:ext>
-    </p:extLst>
-  </p:cSld>
-  <p:clrMapOvr>
-    <a:masterClrMapping/>
-  </p:clrMapOvr>
-</p:sld>
-</file>
-
-<file path=ppt/slides/slide5.xml><?xml version="1.0" encoding="utf-8"?>
-<p:sld xmlns:a="http://schemas.openxmlformats.org/drawingml/2006/main" xmlns:r="http://schemas.openxmlformats.org/officeDocument/2006/relationships" xmlns:p="http://schemas.openxmlformats.org/presentationml/2006/main">
-  <p:cSld>
-    <p:spTree>
-      <p:nvGrpSpPr>
-        <p:cNvPr id="1" name=""/>
-        <p:cNvGrpSpPr/>
-        <p:nvPr/>
-      </p:nvGrpSpPr>
-      <p:grpSpPr>
-        <a:xfrm>
-          <a:off x="0" y="0"/>
-          <a:ext cx="0" cy="0"/>
-          <a:chOff x="0" y="0"/>
-          <a:chExt cx="0" cy="0"/>
-        </a:xfrm>
-      </p:grpSpPr>
       <p:sp>
         <p:nvSpPr>
-          <p:cNvPr id="2" name="Title 1">
+          <p:cNvPr id="5" name="Content Placeholder 2">
             <a:extLst>
               <a:ext uri="{FF2B5EF4-FFF2-40B4-BE49-F238E27FC236}">
-                <a16:creationId xmlns:a16="http://schemas.microsoft.com/office/drawing/2014/main" id="{2CF0F049-C2BF-4F74-BA0A-C80AE4272D4E}"/>
-              </a:ext>
-            </a:extLst>
-          </p:cNvPr>
-          <p:cNvSpPr>
-            <a:spLocks noGrp="1"/>
-          </p:cNvSpPr>
-          <p:nvPr>
-            <p:ph type="title"/>
-          </p:nvPr>
-        </p:nvSpPr>
-        <p:spPr>
-          <a:xfrm>
-            <a:off x="696912" y="116632"/>
-            <a:ext cx="10798175" cy="533400"/>
-          </a:xfrm>
-        </p:spPr>
-        <p:txBody>
-          <a:bodyPr/>
-          <a:lstStyle/>
-          <a:p>
-            <a:pPr algn="ctr"/>
-            <a:r>
-              <a:rPr lang="en-GB" b="0" dirty="0"/>
-              <a:t>Comparison of effects</a:t>
-            </a:r>
-            <a:endParaRPr lang="en-GB" dirty="0"/>
-          </a:p>
-        </p:txBody>
-      </p:sp>
-      <p:sp>
-        <p:nvSpPr>
-          <p:cNvPr id="3" name="Content Placeholder 2">
-            <a:extLst>
-              <a:ext uri="{FF2B5EF4-FFF2-40B4-BE49-F238E27FC236}">
-                <a16:creationId xmlns:a16="http://schemas.microsoft.com/office/drawing/2014/main" id="{B878A8B9-376F-4848-9DC4-33F7894E6F88}"/>
-              </a:ext>
-            </a:extLst>
-          </p:cNvPr>
-          <p:cNvSpPr>
-            <a:spLocks noGrp="1"/>
-          </p:cNvSpPr>
-          <p:nvPr>
-            <p:ph idx="1"/>
-          </p:nvPr>
-        </p:nvSpPr>
-        <p:spPr>
-          <a:xfrm>
-            <a:off x="696913" y="836712"/>
-            <a:ext cx="10798175" cy="5103713"/>
-          </a:xfrm>
-        </p:spPr>
-        <p:txBody>
-          <a:bodyPr/>
-          <a:lstStyle/>
-          <a:p>
-            <a:r>
-              <a:rPr lang="en-GB" dirty="0"/>
-              <a:t>The difference in the effect of the transformation is better shown on the same scale</a:t>
-            </a:r>
-          </a:p>
-        </p:txBody>
-      </p:sp>
-      <p:pic>
-        <p:nvPicPr>
-          <p:cNvPr id="5" name="Picture 4">
-            <a:extLst>
-              <a:ext uri="{FF2B5EF4-FFF2-40B4-BE49-F238E27FC236}">
-                <a16:creationId xmlns:a16="http://schemas.microsoft.com/office/drawing/2014/main" id="{932B466F-6638-4BAD-8811-A481BD8C3BE4}"/>
-              </a:ext>
-            </a:extLst>
-          </p:cNvPr>
-          <p:cNvPicPr>
-            <a:picLocks noChangeAspect="1"/>
-          </p:cNvPicPr>
-          <p:nvPr/>
-        </p:nvPicPr>
-        <p:blipFill>
-          <a:blip r:embed="rId2"/>
-          <a:stretch>
-            <a:fillRect/>
-          </a:stretch>
-        </p:blipFill>
-        <p:spPr>
-          <a:xfrm>
-            <a:off x="690895" y="2204864"/>
-            <a:ext cx="10798175" cy="4054191"/>
-          </a:xfrm>
-          <a:prstGeom prst="rect">
-            <a:avLst/>
-          </a:prstGeom>
-        </p:spPr>
-      </p:pic>
-    </p:spTree>
-    <p:extLst>
-      <p:ext uri="{BB962C8B-B14F-4D97-AF65-F5344CB8AC3E}">
-        <p14:creationId xmlns:p14="http://schemas.microsoft.com/office/powerpoint/2010/main" val="3587142001"/>
-      </p:ext>
-    </p:extLst>
-  </p:cSld>
-  <p:clrMapOvr>
-    <a:masterClrMapping/>
-  </p:clrMapOvr>
-</p:sld>
-</file>
-
-<file path=ppt/slides/slide6.xml><?xml version="1.0" encoding="utf-8"?>
-<p:sld xmlns:a="http://schemas.openxmlformats.org/drawingml/2006/main" xmlns:r="http://schemas.openxmlformats.org/officeDocument/2006/relationships" xmlns:p="http://schemas.openxmlformats.org/presentationml/2006/main">
-  <p:cSld>
-    <p:spTree>
-      <p:nvGrpSpPr>
-        <p:cNvPr id="1" name=""/>
-        <p:cNvGrpSpPr/>
-        <p:nvPr/>
-      </p:nvGrpSpPr>
-      <p:grpSpPr>
-        <a:xfrm>
-          <a:off x="0" y="0"/>
-          <a:ext cx="0" cy="0"/>
-          <a:chOff x="0" y="0"/>
-          <a:chExt cx="0" cy="0"/>
-        </a:xfrm>
-      </p:grpSpPr>
-      <p:sp>
-        <p:nvSpPr>
-          <p:cNvPr id="2" name="Title 1">
-            <a:extLst>
-              <a:ext uri="{FF2B5EF4-FFF2-40B4-BE49-F238E27FC236}">
-                <a16:creationId xmlns:a16="http://schemas.microsoft.com/office/drawing/2014/main" id="{7F41F91D-9BD2-4B2D-B6D6-DBC0FDCF15A6}"/>
-              </a:ext>
-            </a:extLst>
-          </p:cNvPr>
-          <p:cNvSpPr>
-            <a:spLocks noGrp="1"/>
-          </p:cNvSpPr>
-          <p:nvPr>
-            <p:ph type="title"/>
-          </p:nvPr>
-        </p:nvSpPr>
-        <p:spPr>
-          <a:xfrm>
-            <a:off x="696913" y="116632"/>
-            <a:ext cx="10798175" cy="533400"/>
-          </a:xfrm>
-        </p:spPr>
-        <p:txBody>
-          <a:bodyPr/>
-          <a:lstStyle/>
-          <a:p>
-            <a:pPr algn="ctr"/>
-            <a:r>
-              <a:rPr lang="en-GB" dirty="0"/>
-              <a:t>Different point of view</a:t>
-            </a:r>
-          </a:p>
-        </p:txBody>
-      </p:sp>
-      <mc:AlternateContent xmlns:mc="http://schemas.openxmlformats.org/markup-compatibility/2006" xmlns:a14="http://schemas.microsoft.com/office/drawing/2010/main">
-        <mc:Choice Requires="a14">
-          <p:sp>
-            <p:nvSpPr>
-              <p:cNvPr id="3" name="Content Placeholder 2">
-                <a:extLst>
-                  <a:ext uri="{FF2B5EF4-FFF2-40B4-BE49-F238E27FC236}">
-                    <a16:creationId xmlns:a16="http://schemas.microsoft.com/office/drawing/2014/main" id="{BDDF3122-5874-48BB-A94D-7E555BE6EC01}"/>
-                  </a:ext>
-                </a:extLst>
-              </p:cNvPr>
-              <p:cNvSpPr>
-                <a:spLocks noGrp="1"/>
-              </p:cNvSpPr>
-              <p:nvPr>
-                <p:ph idx="1"/>
-              </p:nvPr>
-            </p:nvSpPr>
-            <p:spPr>
-              <a:xfrm>
-                <a:off x="696913" y="908720"/>
-                <a:ext cx="10798175" cy="5031705"/>
-              </a:xfrm>
-            </p:spPr>
-            <p:txBody>
-              <a:bodyPr/>
-              <a:lstStyle/>
-              <a:p>
-                <a:r>
-                  <a:rPr lang="en-GB" dirty="0"/>
-                  <a:t>Both approaches have limitations</a:t>
-                </a:r>
-              </a:p>
-              <a:p>
-                <a:pPr lvl="1"/>
-                <a:r>
-                  <a:rPr lang="en-GB" dirty="0"/>
-                  <a:t>The regression parameters are interpretable in terms of the mean of </a:t>
-                </a:r>
-                <a14:m>
-                  <m:oMath xmlns:m="http://schemas.openxmlformats.org/officeDocument/2006/math">
-                    <m:acc>
-                      <m:accPr>
-                        <m:chr m:val="̃"/>
-                        <m:ctrlPr>
-                          <a:rPr lang="en-GB" i="1" smtClean="0">
-                            <a:latin typeface="Cambria Math" panose="02040503050406030204" pitchFamily="18" charset="0"/>
-                          </a:rPr>
-                        </m:ctrlPr>
-                      </m:accPr>
-                      <m:e>
-                        <m:r>
-                          <m:rPr>
-                            <m:sty m:val="p"/>
-                          </m:rPr>
-                          <a:rPr lang="en-GB" b="0" i="0" smtClean="0">
-                            <a:latin typeface="Cambria Math" panose="02040503050406030204" pitchFamily="18" charset="0"/>
-                          </a:rPr>
-                          <m:t>Y</m:t>
-                        </m:r>
-                      </m:e>
-                    </m:acc>
-                  </m:oMath>
-                </a14:m>
-                <a:r>
-                  <a:rPr lang="el-GR" dirty="0"/>
-                  <a:t> </a:t>
-                </a:r>
-                <a:r>
-                  <a:rPr lang="en-GB" dirty="0"/>
-                  <a:t>not in Y</a:t>
-                </a:r>
-              </a:p>
-              <a:p>
-                <a:pPr lvl="1"/>
-                <a:r>
-                  <a:rPr lang="en-GB" dirty="0"/>
-                  <a:t>Rates and proportions are typically heteroskedastic</a:t>
-                </a:r>
-              </a:p>
-              <a:p>
-                <a:pPr lvl="2"/>
-                <a:r>
-                  <a:rPr lang="en-GB" dirty="0"/>
-                  <a:t>With less variation as we approach the lower and upper limits</a:t>
-                </a:r>
-              </a:p>
-              <a:p>
-                <a:pPr lvl="2"/>
-                <a:r>
-                  <a:rPr lang="en-GB" dirty="0"/>
-                  <a:t>And more variation around the middle</a:t>
-                </a:r>
-              </a:p>
-              <a:p>
-                <a:pPr lvl="1"/>
-                <a:r>
-                  <a:rPr lang="en-GB" dirty="0"/>
-                  <a:t>Distributions of rates and proportions are typically asymmetric</a:t>
-                </a:r>
-              </a:p>
-              <a:p>
-                <a:pPr lvl="2"/>
-                <a:r>
-                  <a:rPr lang="en-GB" dirty="0"/>
-                  <a:t>interval estimation and hypothesis testing can be quite inaccurate in small samples</a:t>
-                </a:r>
-              </a:p>
-              <a:p>
-                <a:endParaRPr lang="en-GB" dirty="0"/>
-              </a:p>
-              <a:p>
-                <a:r>
-                  <a:rPr lang="en-GB" dirty="0">
-                    <a:hlinkClick r:id="rId2" action="ppaction://hlinksldjump"/>
-                  </a:rPr>
-                  <a:t>Ferrari and </a:t>
-                </a:r>
-                <a:r>
-                  <a:rPr lang="en-GB" dirty="0" err="1">
-                    <a:hlinkClick r:id="rId2" action="ppaction://hlinksldjump"/>
-                  </a:rPr>
-                  <a:t>Cribari-Neto</a:t>
-                </a:r>
-                <a:r>
-                  <a:rPr lang="en-GB" dirty="0">
-                    <a:hlinkClick r:id="rId2" action="ppaction://hlinksldjump"/>
-                  </a:rPr>
-                  <a:t> (2004) </a:t>
-                </a:r>
-                <a:r>
-                  <a:rPr lang="en-GB" dirty="0"/>
-                  <a:t>proposed a “regression” model for bounded continuous outcomes</a:t>
-                </a:r>
-              </a:p>
-              <a:p>
-                <a:pPr lvl="1"/>
-                <a:r>
-                  <a:rPr lang="en-GB" dirty="0"/>
-                  <a:t>Key assumption is that the response variable is beta-distributed</a:t>
-                </a:r>
-              </a:p>
-              <a:p>
-                <a:pPr lvl="1"/>
-                <a:r>
-                  <a:rPr lang="en-GB" dirty="0"/>
-                  <a:t>Benefits :</a:t>
-                </a:r>
-              </a:p>
-              <a:p>
-                <a:pPr lvl="2"/>
-                <a:r>
-                  <a:rPr lang="en-GB" dirty="0"/>
-                  <a:t>The regression parameters are interpretable in terms of the mean of Y</a:t>
-                </a:r>
-              </a:p>
-              <a:p>
-                <a:pPr lvl="2"/>
-                <a:r>
-                  <a:rPr lang="en-GB" dirty="0"/>
-                  <a:t>The model is naturally heteroskedastic and easily accommodates asymmetries</a:t>
-                </a:r>
-              </a:p>
-              <a:p>
-                <a:r>
-                  <a:rPr lang="pt-BR" dirty="0">
-                    <a:hlinkClick r:id="rId2" action="ppaction://hlinksldjump"/>
-                  </a:rPr>
-                  <a:t>Simas, Barreto-Souza, and Rocha (2010)</a:t>
-                </a:r>
-                <a:r>
-                  <a:rPr lang="el-GR" dirty="0">
-                    <a:hlinkClick r:id="rId2" action="ppaction://hlinksldjump"/>
-                  </a:rPr>
-                  <a:t> </a:t>
-                </a:r>
-                <a:r>
-                  <a:rPr lang="en-GB" dirty="0"/>
-                  <a:t>developed beta regression to allow nonlinearities and variable dispersion </a:t>
-                </a:r>
-              </a:p>
-              <a:p>
-                <a:endParaRPr lang="en-GB" dirty="0"/>
-              </a:p>
-            </p:txBody>
-          </p:sp>
-        </mc:Choice>
-        <mc:Fallback xmlns="">
-          <p:sp>
-            <p:nvSpPr>
-              <p:cNvPr id="3" name="Content Placeholder 2">
-                <a:extLst>
-                  <a:ext uri="{FF2B5EF4-FFF2-40B4-BE49-F238E27FC236}">
-                    <a16:creationId xmlns:a16="http://schemas.microsoft.com/office/drawing/2014/main" id="{BDDF3122-5874-48BB-A94D-7E555BE6EC01}"/>
-                  </a:ext>
-                </a:extLst>
-              </p:cNvPr>
-              <p:cNvSpPr>
-                <a:spLocks noGrp="1" noRot="1" noChangeAspect="1" noMove="1" noResize="1" noEditPoints="1" noAdjustHandles="1" noChangeArrowheads="1" noChangeShapeType="1" noTextEdit="1"/>
-              </p:cNvSpPr>
-              <p:nvPr>
-                <p:ph idx="1"/>
-              </p:nvPr>
-            </p:nvSpPr>
-            <p:spPr>
-              <a:xfrm>
-                <a:off x="696913" y="908720"/>
-                <a:ext cx="10798175" cy="5031705"/>
-              </a:xfrm>
-              <a:blipFill>
-                <a:blip r:embed="rId3"/>
-                <a:stretch>
-                  <a:fillRect l="-1354" t="-1576"/>
-                </a:stretch>
-              </a:blipFill>
-            </p:spPr>
-            <p:txBody>
-              <a:bodyPr/>
-              <a:lstStyle/>
-              <a:p>
-                <a:r>
-                  <a:rPr lang="en-GB">
-                    <a:noFill/>
-                  </a:rPr>
-                  <a:t> </a:t>
-                </a:r>
-              </a:p>
-            </p:txBody>
-          </p:sp>
-        </mc:Fallback>
-      </mc:AlternateContent>
-    </p:spTree>
-    <p:extLst>
-      <p:ext uri="{BB962C8B-B14F-4D97-AF65-F5344CB8AC3E}">
-        <p14:creationId xmlns:p14="http://schemas.microsoft.com/office/powerpoint/2010/main" val="1553846302"/>
-      </p:ext>
-    </p:extLst>
-  </p:cSld>
-  <p:clrMapOvr>
-    <a:masterClrMapping/>
-  </p:clrMapOvr>
-</p:sld>
-</file>
-
-<file path=ppt/slides/slide7.xml><?xml version="1.0" encoding="utf-8"?>
-<p:sld xmlns:a="http://schemas.openxmlformats.org/drawingml/2006/main" xmlns:r="http://schemas.openxmlformats.org/officeDocument/2006/relationships" xmlns:p="http://schemas.openxmlformats.org/presentationml/2006/main">
-  <p:cSld>
-    <p:spTree>
-      <p:nvGrpSpPr>
-        <p:cNvPr id="1" name=""/>
-        <p:cNvGrpSpPr/>
-        <p:nvPr/>
-      </p:nvGrpSpPr>
-      <p:grpSpPr>
-        <a:xfrm>
-          <a:off x="0" y="0"/>
-          <a:ext cx="0" cy="0"/>
-          <a:chOff x="0" y="0"/>
-          <a:chExt cx="0" cy="0"/>
-        </a:xfrm>
-      </p:grpSpPr>
-      <p:sp>
-        <p:nvSpPr>
-          <p:cNvPr id="2" name="Title 1">
-            <a:extLst>
-              <a:ext uri="{FF2B5EF4-FFF2-40B4-BE49-F238E27FC236}">
-                <a16:creationId xmlns:a16="http://schemas.microsoft.com/office/drawing/2014/main" id="{51381CBB-FB1E-4B9B-923D-E9909EFB905A}"/>
-              </a:ext>
-            </a:extLst>
-          </p:cNvPr>
-          <p:cNvSpPr>
-            <a:spLocks noGrp="1"/>
-          </p:cNvSpPr>
-          <p:nvPr>
-            <p:ph type="title"/>
-          </p:nvPr>
-        </p:nvSpPr>
-        <p:spPr>
-          <a:xfrm>
-            <a:off x="696913" y="116632"/>
-            <a:ext cx="10798175" cy="533400"/>
-          </a:xfrm>
-        </p:spPr>
-        <p:txBody>
-          <a:bodyPr/>
-          <a:lstStyle/>
-          <a:p>
-            <a:pPr algn="ctr"/>
-            <a:r>
-              <a:rPr lang="en-GB" dirty="0"/>
-              <a:t>Beta distribution</a:t>
-            </a:r>
-          </a:p>
-        </p:txBody>
-      </p:sp>
-      <p:pic>
-        <p:nvPicPr>
-          <p:cNvPr id="4" name="Picture 3">
-            <a:extLst>
-              <a:ext uri="{FF2B5EF4-FFF2-40B4-BE49-F238E27FC236}">
-                <a16:creationId xmlns:a16="http://schemas.microsoft.com/office/drawing/2014/main" id="{2DA97E49-2C4E-4663-9C3E-71F8B084712B}"/>
-              </a:ext>
-            </a:extLst>
-          </p:cNvPr>
-          <p:cNvPicPr>
-            <a:picLocks noChangeAspect="1"/>
-          </p:cNvPicPr>
-          <p:nvPr/>
-        </p:nvPicPr>
-        <p:blipFill>
-          <a:blip r:embed="rId2"/>
-          <a:stretch>
-            <a:fillRect/>
-          </a:stretch>
-        </p:blipFill>
-        <p:spPr>
-          <a:xfrm>
-            <a:off x="696912" y="838910"/>
-            <a:ext cx="10798175" cy="4721967"/>
-          </a:xfrm>
-          <a:prstGeom prst="rect">
-            <a:avLst/>
-          </a:prstGeom>
-        </p:spPr>
-      </p:pic>
-      <p:sp>
-        <p:nvSpPr>
-          <p:cNvPr id="6" name="Content Placeholder 2">
-            <a:extLst>
-              <a:ext uri="{FF2B5EF4-FFF2-40B4-BE49-F238E27FC236}">
-                <a16:creationId xmlns:a16="http://schemas.microsoft.com/office/drawing/2014/main" id="{86B400F3-5531-4E08-A6D6-93A35EDCA9C8}"/>
+                <a16:creationId xmlns:a16="http://schemas.microsoft.com/office/drawing/2014/main" id="{64F90E9F-3916-4D26-A806-F073A689C3FE}"/>
               </a:ext>
             </a:extLst>
           </p:cNvPr>
@@ -20185,8 +20312,8 @@
         </p:nvSpPr>
         <p:spPr bwMode="auto">
           <a:xfrm>
-            <a:off x="701240" y="5749756"/>
-            <a:ext cx="10798175" cy="432048"/>
+            <a:off x="551384" y="908720"/>
+            <a:ext cx="10943703" cy="1152128"/>
           </a:xfrm>
           <a:prstGeom prst="rect">
             <a:avLst/>
@@ -20394,13 +20521,22 @@
             </a:lvl9pPr>
           </a:lstStyle>
           <a:p>
-            <a:pPr marL="0" indent="0">
-              <a:buFont typeface="Arial" charset="0"/>
-              <a:buNone/>
-            </a:pPr>
             <a:r>
               <a:rPr lang="en-GB" dirty="0"/>
-              <a:t>Probability density functions for beta distributions with varying parameters</a:t>
+              <a:t>Logit transformation </a:t>
+            </a:r>
+          </a:p>
+          <a:p>
+            <a:pPr algn="ctr"/>
+            <a:r>
+              <a:rPr lang="en-GB" dirty="0"/>
+              <a:t>log(p/1-p)</a:t>
+            </a:r>
+          </a:p>
+          <a:p>
+            <a:r>
+              <a:rPr lang="en-GB" dirty="0"/>
+              <a:t>The transformation pulls out the ends of the distribution more than the arcsine transformation</a:t>
             </a:r>
           </a:p>
         </p:txBody>
@@ -20408,7 +20544,586 @@
     </p:spTree>
     <p:extLst>
       <p:ext uri="{BB962C8B-B14F-4D97-AF65-F5344CB8AC3E}">
-        <p14:creationId xmlns:p14="http://schemas.microsoft.com/office/powerpoint/2010/main" val="1175052142"/>
+        <p14:creationId xmlns:p14="http://schemas.microsoft.com/office/powerpoint/2010/main" val="3854208231"/>
+      </p:ext>
+    </p:extLst>
+  </p:cSld>
+  <p:clrMapOvr>
+    <a:masterClrMapping/>
+  </p:clrMapOvr>
+</p:sld>
+</file>
+
+<file path=ppt/slides/slide5.xml><?xml version="1.0" encoding="utf-8"?>
+<p:sld xmlns:a="http://schemas.openxmlformats.org/drawingml/2006/main" xmlns:r="http://schemas.openxmlformats.org/officeDocument/2006/relationships" xmlns:p="http://schemas.openxmlformats.org/presentationml/2006/main">
+  <p:cSld>
+    <p:spTree>
+      <p:nvGrpSpPr>
+        <p:cNvPr id="1" name=""/>
+        <p:cNvGrpSpPr/>
+        <p:nvPr/>
+      </p:nvGrpSpPr>
+      <p:grpSpPr>
+        <a:xfrm>
+          <a:off x="0" y="0"/>
+          <a:ext cx="0" cy="0"/>
+          <a:chOff x="0" y="0"/>
+          <a:chExt cx="0" cy="0"/>
+        </a:xfrm>
+      </p:grpSpPr>
+      <p:sp>
+        <p:nvSpPr>
+          <p:cNvPr id="2" name="Title 1">
+            <a:extLst>
+              <a:ext uri="{FF2B5EF4-FFF2-40B4-BE49-F238E27FC236}">
+                <a16:creationId xmlns:a16="http://schemas.microsoft.com/office/drawing/2014/main" id="{2CF0F049-C2BF-4F74-BA0A-C80AE4272D4E}"/>
+              </a:ext>
+            </a:extLst>
+          </p:cNvPr>
+          <p:cNvSpPr>
+            <a:spLocks noGrp="1"/>
+          </p:cNvSpPr>
+          <p:nvPr>
+            <p:ph type="title"/>
+          </p:nvPr>
+        </p:nvSpPr>
+        <p:spPr>
+          <a:xfrm>
+            <a:off x="696912" y="116632"/>
+            <a:ext cx="10798175" cy="533400"/>
+          </a:xfrm>
+        </p:spPr>
+        <p:txBody>
+          <a:bodyPr/>
+          <a:lstStyle/>
+          <a:p>
+            <a:pPr algn="ctr"/>
+            <a:r>
+              <a:rPr lang="en-GB" b="0" dirty="0"/>
+              <a:t>Comparison of effects</a:t>
+            </a:r>
+            <a:endParaRPr lang="en-GB" dirty="0"/>
+          </a:p>
+        </p:txBody>
+      </p:sp>
+      <p:sp>
+        <p:nvSpPr>
+          <p:cNvPr id="3" name="Content Placeholder 2">
+            <a:extLst>
+              <a:ext uri="{FF2B5EF4-FFF2-40B4-BE49-F238E27FC236}">
+                <a16:creationId xmlns:a16="http://schemas.microsoft.com/office/drawing/2014/main" id="{B878A8B9-376F-4848-9DC4-33F7894E6F88}"/>
+              </a:ext>
+            </a:extLst>
+          </p:cNvPr>
+          <p:cNvSpPr>
+            <a:spLocks noGrp="1"/>
+          </p:cNvSpPr>
+          <p:nvPr>
+            <p:ph idx="1"/>
+          </p:nvPr>
+        </p:nvSpPr>
+        <p:spPr>
+          <a:xfrm>
+            <a:off x="696913" y="836712"/>
+            <a:ext cx="10798175" cy="5103713"/>
+          </a:xfrm>
+        </p:spPr>
+        <p:txBody>
+          <a:bodyPr/>
+          <a:lstStyle/>
+          <a:p>
+            <a:r>
+              <a:rPr lang="en-GB" dirty="0"/>
+              <a:t>The difference in the effect of the transformation is better shown on the same scale</a:t>
+            </a:r>
+          </a:p>
+        </p:txBody>
+      </p:sp>
+      <p:pic>
+        <p:nvPicPr>
+          <p:cNvPr id="5" name="Picture 4">
+            <a:extLst>
+              <a:ext uri="{FF2B5EF4-FFF2-40B4-BE49-F238E27FC236}">
+                <a16:creationId xmlns:a16="http://schemas.microsoft.com/office/drawing/2014/main" id="{932B466F-6638-4BAD-8811-A481BD8C3BE4}"/>
+              </a:ext>
+            </a:extLst>
+          </p:cNvPr>
+          <p:cNvPicPr>
+            <a:picLocks noChangeAspect="1"/>
+          </p:cNvPicPr>
+          <p:nvPr/>
+        </p:nvPicPr>
+        <p:blipFill>
+          <a:blip r:embed="rId2"/>
+          <a:stretch>
+            <a:fillRect/>
+          </a:stretch>
+        </p:blipFill>
+        <p:spPr>
+          <a:xfrm>
+            <a:off x="690895" y="1700808"/>
+            <a:ext cx="10798175" cy="4558247"/>
+          </a:xfrm>
+          <a:prstGeom prst="rect">
+            <a:avLst/>
+          </a:prstGeom>
+        </p:spPr>
+      </p:pic>
+    </p:spTree>
+    <p:extLst>
+      <p:ext uri="{BB962C8B-B14F-4D97-AF65-F5344CB8AC3E}">
+        <p14:creationId xmlns:p14="http://schemas.microsoft.com/office/powerpoint/2010/main" val="3587142001"/>
+      </p:ext>
+    </p:extLst>
+  </p:cSld>
+  <p:clrMapOvr>
+    <a:masterClrMapping/>
+  </p:clrMapOvr>
+</p:sld>
+</file>
+
+<file path=ppt/slides/slide6.xml><?xml version="1.0" encoding="utf-8"?>
+<p:sld xmlns:a="http://schemas.openxmlformats.org/drawingml/2006/main" xmlns:r="http://schemas.openxmlformats.org/officeDocument/2006/relationships" xmlns:p="http://schemas.openxmlformats.org/presentationml/2006/main">
+  <p:cSld>
+    <p:spTree>
+      <p:nvGrpSpPr>
+        <p:cNvPr id="1" name=""/>
+        <p:cNvGrpSpPr/>
+        <p:nvPr/>
+      </p:nvGrpSpPr>
+      <p:grpSpPr>
+        <a:xfrm>
+          <a:off x="0" y="0"/>
+          <a:ext cx="0" cy="0"/>
+          <a:chOff x="0" y="0"/>
+          <a:chExt cx="0" cy="0"/>
+        </a:xfrm>
+      </p:grpSpPr>
+      <p:sp>
+        <p:nvSpPr>
+          <p:cNvPr id="2" name="Title 1">
+            <a:extLst>
+              <a:ext uri="{FF2B5EF4-FFF2-40B4-BE49-F238E27FC236}">
+                <a16:creationId xmlns:a16="http://schemas.microsoft.com/office/drawing/2014/main" id="{A12A9DFC-1D19-4B7E-90A8-301BBF9442F3}"/>
+              </a:ext>
+            </a:extLst>
+          </p:cNvPr>
+          <p:cNvSpPr>
+            <a:spLocks noGrp="1"/>
+          </p:cNvSpPr>
+          <p:nvPr>
+            <p:ph type="title"/>
+          </p:nvPr>
+        </p:nvSpPr>
+        <p:spPr>
+          <a:xfrm>
+            <a:off x="680145" y="116632"/>
+            <a:ext cx="10798175" cy="533400"/>
+          </a:xfrm>
+        </p:spPr>
+        <p:txBody>
+          <a:bodyPr/>
+          <a:lstStyle/>
+          <a:p>
+            <a:pPr algn="ctr"/>
+            <a:r>
+              <a:rPr lang="en-GB" dirty="0"/>
+              <a:t>Which one should we choose?</a:t>
+            </a:r>
+          </a:p>
+        </p:txBody>
+      </p:sp>
+      <p:sp>
+        <p:nvSpPr>
+          <p:cNvPr id="3" name="Content Placeholder 2">
+            <a:extLst>
+              <a:ext uri="{FF2B5EF4-FFF2-40B4-BE49-F238E27FC236}">
+                <a16:creationId xmlns:a16="http://schemas.microsoft.com/office/drawing/2014/main" id="{409D69CD-1BD9-4665-ACFC-51DF677BF36E}"/>
+              </a:ext>
+            </a:extLst>
+          </p:cNvPr>
+          <p:cNvSpPr>
+            <a:spLocks noGrp="1"/>
+          </p:cNvSpPr>
+          <p:nvPr>
+            <p:ph idx="1"/>
+          </p:nvPr>
+        </p:nvSpPr>
+        <p:spPr>
+          <a:xfrm>
+            <a:off x="696913" y="1196752"/>
+            <a:ext cx="10798175" cy="4743673"/>
+          </a:xfrm>
+        </p:spPr>
+        <p:txBody>
+          <a:bodyPr/>
+          <a:lstStyle/>
+          <a:p>
+            <a:r>
+              <a:rPr lang="en-GB" dirty="0">
+                <a:hlinkClick r:id="rId3" action="ppaction://hlinksldjump"/>
+              </a:rPr>
+              <a:t>Wilson et al. (2010) </a:t>
+            </a:r>
+            <a:r>
+              <a:rPr lang="en-GB" dirty="0"/>
+              <a:t>and </a:t>
+            </a:r>
+            <a:r>
+              <a:rPr lang="en-GB" dirty="0">
+                <a:hlinkClick r:id="rId3" action="ppaction://hlinksldjump"/>
+              </a:rPr>
+              <a:t>Warton, D.I., and F.K.C. Hui. 2011</a:t>
+            </a:r>
+            <a:endParaRPr lang="en-GB" dirty="0"/>
+          </a:p>
+          <a:p>
+            <a:r>
+              <a:rPr lang="en-GB" dirty="0"/>
+              <a:t> Are suggesting the use of logit transformation</a:t>
+            </a:r>
+          </a:p>
+          <a:p>
+            <a:pPr lvl="1"/>
+            <a:r>
+              <a:rPr lang="en-GB" dirty="0"/>
+              <a:t>The logit scale covers all of the real numbers (important for predictions)</a:t>
+            </a:r>
+          </a:p>
+          <a:p>
+            <a:pPr lvl="1"/>
+            <a:r>
+              <a:rPr lang="en-GB" dirty="0"/>
+              <a:t>The logit scale is more intuitive </a:t>
+            </a:r>
+          </a:p>
+          <a:p>
+            <a:pPr lvl="1"/>
+            <a:r>
+              <a:rPr lang="en-GB" dirty="0"/>
+              <a:t>The logit scale correctly models the relationship between the mean and variance in binomial data, where variance is p(1-p)/n.</a:t>
+            </a:r>
+          </a:p>
+          <a:p>
+            <a:pPr lvl="1"/>
+            <a:endParaRPr lang="en-GB" dirty="0"/>
+          </a:p>
+          <a:p>
+            <a:r>
+              <a:rPr lang="en-GB" dirty="0"/>
+              <a:t>BUT in some cases the limited range of the arcsine is beneficial (i.e. when zeros and ones are present)</a:t>
+            </a:r>
+          </a:p>
+          <a:p>
+            <a:endParaRPr lang="en-GB" dirty="0"/>
+          </a:p>
+          <a:p>
+            <a:r>
+              <a:rPr lang="en-GB" dirty="0"/>
+              <a:t>Of course, both transformations are essentially linear over the range of 0.3–0.7, neither transformation is necessary if all of your data fall in this range.</a:t>
+            </a:r>
+          </a:p>
+        </p:txBody>
+      </p:sp>
+    </p:spTree>
+    <p:extLst>
+      <p:ext uri="{BB962C8B-B14F-4D97-AF65-F5344CB8AC3E}">
+        <p14:creationId xmlns:p14="http://schemas.microsoft.com/office/powerpoint/2010/main" val="3746431269"/>
+      </p:ext>
+    </p:extLst>
+  </p:cSld>
+  <p:clrMapOvr>
+    <a:masterClrMapping/>
+  </p:clrMapOvr>
+</p:sld>
+</file>
+
+<file path=ppt/slides/slide7.xml><?xml version="1.0" encoding="utf-8"?>
+<p:sld xmlns:a="http://schemas.openxmlformats.org/drawingml/2006/main" xmlns:r="http://schemas.openxmlformats.org/officeDocument/2006/relationships" xmlns:p="http://schemas.openxmlformats.org/presentationml/2006/main">
+  <p:cSld>
+    <p:spTree>
+      <p:nvGrpSpPr>
+        <p:cNvPr id="1" name=""/>
+        <p:cNvGrpSpPr/>
+        <p:nvPr/>
+      </p:nvGrpSpPr>
+      <p:grpSpPr>
+        <a:xfrm>
+          <a:off x="0" y="0"/>
+          <a:ext cx="0" cy="0"/>
+          <a:chOff x="0" y="0"/>
+          <a:chExt cx="0" cy="0"/>
+        </a:xfrm>
+      </p:grpSpPr>
+      <p:sp>
+        <p:nvSpPr>
+          <p:cNvPr id="2" name="Title 1">
+            <a:extLst>
+              <a:ext uri="{FF2B5EF4-FFF2-40B4-BE49-F238E27FC236}">
+                <a16:creationId xmlns:a16="http://schemas.microsoft.com/office/drawing/2014/main" id="{7F41F91D-9BD2-4B2D-B6D6-DBC0FDCF15A6}"/>
+              </a:ext>
+            </a:extLst>
+          </p:cNvPr>
+          <p:cNvSpPr>
+            <a:spLocks noGrp="1"/>
+          </p:cNvSpPr>
+          <p:nvPr>
+            <p:ph type="title"/>
+          </p:nvPr>
+        </p:nvSpPr>
+        <p:spPr>
+          <a:xfrm>
+            <a:off x="696913" y="116632"/>
+            <a:ext cx="10798175" cy="533400"/>
+          </a:xfrm>
+        </p:spPr>
+        <p:txBody>
+          <a:bodyPr/>
+          <a:lstStyle/>
+          <a:p>
+            <a:pPr algn="ctr"/>
+            <a:r>
+              <a:rPr lang="en-GB" dirty="0"/>
+              <a:t>Different point of view</a:t>
+            </a:r>
+          </a:p>
+        </p:txBody>
+      </p:sp>
+      <mc:AlternateContent xmlns:mc="http://schemas.openxmlformats.org/markup-compatibility/2006">
+        <mc:Choice xmlns:a14="http://schemas.microsoft.com/office/drawing/2010/main" Requires="a14">
+          <p:sp>
+            <p:nvSpPr>
+              <p:cNvPr id="3" name="Content Placeholder 2">
+                <a:extLst>
+                  <a:ext uri="{FF2B5EF4-FFF2-40B4-BE49-F238E27FC236}">
+                    <a16:creationId xmlns:a16="http://schemas.microsoft.com/office/drawing/2014/main" id="{BDDF3122-5874-48BB-A94D-7E555BE6EC01}"/>
+                  </a:ext>
+                </a:extLst>
+              </p:cNvPr>
+              <p:cNvSpPr>
+                <a:spLocks noGrp="1"/>
+              </p:cNvSpPr>
+              <p:nvPr>
+                <p:ph idx="1"/>
+              </p:nvPr>
+            </p:nvSpPr>
+            <p:spPr>
+              <a:xfrm>
+                <a:off x="696913" y="908720"/>
+                <a:ext cx="10798175" cy="5256584"/>
+              </a:xfrm>
+            </p:spPr>
+            <p:txBody>
+              <a:bodyPr/>
+              <a:lstStyle/>
+              <a:p>
+                <a:r>
+                  <a:rPr lang="en-GB" dirty="0"/>
+                  <a:t>Both approaches have limitations</a:t>
+                </a:r>
+              </a:p>
+              <a:p>
+                <a:pPr lvl="1"/>
+                <a:r>
+                  <a:rPr lang="en-GB" dirty="0"/>
+                  <a:t>The regression parameters are interpretable in terms of the mean of </a:t>
+                </a:r>
+                <a14:m>
+                  <m:oMath xmlns:m="http://schemas.openxmlformats.org/officeDocument/2006/math">
+                    <m:acc>
+                      <m:accPr>
+                        <m:chr m:val="̃"/>
+                        <m:ctrlPr>
+                          <a:rPr lang="en-GB" i="1" smtClean="0">
+                            <a:latin typeface="Cambria Math" panose="02040503050406030204" pitchFamily="18" charset="0"/>
+                          </a:rPr>
+                        </m:ctrlPr>
+                      </m:accPr>
+                      <m:e>
+                        <m:r>
+                          <m:rPr>
+                            <m:sty m:val="p"/>
+                          </m:rPr>
+                          <a:rPr lang="en-GB" b="0" i="0" smtClean="0">
+                            <a:latin typeface="Cambria Math" panose="02040503050406030204" pitchFamily="18" charset="0"/>
+                          </a:rPr>
+                          <m:t>Y</m:t>
+                        </m:r>
+                      </m:e>
+                    </m:acc>
+                  </m:oMath>
+                </a14:m>
+                <a:r>
+                  <a:rPr lang="el-GR" dirty="0"/>
+                  <a:t> </a:t>
+                </a:r>
+                <a:r>
+                  <a:rPr lang="en-GB" dirty="0"/>
+                  <a:t>not in Y</a:t>
+                </a:r>
+              </a:p>
+              <a:p>
+                <a:pPr lvl="1"/>
+                <a:r>
+                  <a:rPr lang="en-GB" dirty="0"/>
+                  <a:t>Rates and proportions are typically heteroskedastic</a:t>
+                </a:r>
+              </a:p>
+              <a:p>
+                <a:pPr lvl="2"/>
+                <a:r>
+                  <a:rPr lang="en-GB" dirty="0"/>
+                  <a:t>With less variation as we approach the lower and upper limits</a:t>
+                </a:r>
+              </a:p>
+              <a:p>
+                <a:pPr lvl="2"/>
+                <a:r>
+                  <a:rPr lang="en-GB" dirty="0"/>
+                  <a:t>And more variation around the middle</a:t>
+                </a:r>
+              </a:p>
+              <a:p>
+                <a:pPr lvl="1"/>
+                <a:r>
+                  <a:rPr lang="en-GB" dirty="0"/>
+                  <a:t>Distributions of rates and proportions are typically asymmetric</a:t>
+                </a:r>
+              </a:p>
+              <a:p>
+                <a:pPr lvl="2"/>
+                <a:r>
+                  <a:rPr lang="en-GB" dirty="0"/>
+                  <a:t>interval estimation and hypothesis testing can be quite inaccurate in small samples</a:t>
+                </a:r>
+              </a:p>
+              <a:p>
+                <a:endParaRPr lang="en-GB" dirty="0"/>
+              </a:p>
+              <a:p>
+                <a:r>
+                  <a:rPr lang="en-GB" dirty="0">
+                    <a:hlinkClick r:id="rId2" action="ppaction://hlinksldjump"/>
+                  </a:rPr>
+                  <a:t>Ferrari and </a:t>
+                </a:r>
+                <a:r>
+                  <a:rPr lang="en-GB" dirty="0" err="1">
+                    <a:hlinkClick r:id="rId2" action="ppaction://hlinksldjump"/>
+                  </a:rPr>
+                  <a:t>Cribari-Neto</a:t>
+                </a:r>
+                <a:r>
+                  <a:rPr lang="en-GB" dirty="0">
+                    <a:hlinkClick r:id="rId2" action="ppaction://hlinksldjump"/>
+                  </a:rPr>
+                  <a:t> (2004) </a:t>
+                </a:r>
+                <a:r>
+                  <a:rPr lang="en-GB" dirty="0"/>
+                  <a:t>proposed a “regression” model for bounded continuous outcomes</a:t>
+                </a:r>
+              </a:p>
+              <a:p>
+                <a:pPr lvl="1"/>
+                <a:r>
+                  <a:rPr lang="en-GB" dirty="0"/>
+                  <a:t>Key assumption is that the response variable is beta-distributed</a:t>
+                </a:r>
+              </a:p>
+              <a:p>
+                <a:pPr lvl="1"/>
+                <a:r>
+                  <a:rPr lang="en-GB" dirty="0"/>
+                  <a:t>Benefits :</a:t>
+                </a:r>
+              </a:p>
+              <a:p>
+                <a:pPr lvl="2"/>
+                <a:r>
+                  <a:rPr lang="en-GB" dirty="0"/>
+                  <a:t>The regression parameters are interpretable in terms of the mean of Y</a:t>
+                </a:r>
+              </a:p>
+              <a:p>
+                <a:pPr lvl="2"/>
+                <a:r>
+                  <a:rPr lang="en-GB" dirty="0"/>
+                  <a:t>The model is naturally heteroskedastic and easily accommodates asymmetries</a:t>
+                </a:r>
+              </a:p>
+              <a:p>
+                <a:r>
+                  <a:rPr lang="pt-BR" dirty="0">
+                    <a:hlinkClick r:id="rId2" action="ppaction://hlinksldjump"/>
+                  </a:rPr>
+                  <a:t>Simas, Barreto-Souza, and Rocha (2010)</a:t>
+                </a:r>
+                <a:r>
+                  <a:rPr lang="el-GR" dirty="0">
+                    <a:hlinkClick r:id="rId2" action="ppaction://hlinksldjump"/>
+                  </a:rPr>
+                  <a:t> </a:t>
+                </a:r>
+                <a:r>
+                  <a:rPr lang="en-GB" dirty="0"/>
+                  <a:t>developed beta regression to allow nonlinearities and variable dispersion </a:t>
+                </a:r>
+              </a:p>
+              <a:p>
+                <a:endParaRPr lang="en-GB" dirty="0"/>
+              </a:p>
+            </p:txBody>
+          </p:sp>
+        </mc:Choice>
+        <mc:Fallback>
+          <p:sp>
+            <p:nvSpPr>
+              <p:cNvPr id="3" name="Content Placeholder 2">
+                <a:extLst>
+                  <a:ext uri="{FF2B5EF4-FFF2-40B4-BE49-F238E27FC236}">
+                    <a16:creationId xmlns:a16="http://schemas.microsoft.com/office/drawing/2014/main" id="{BDDF3122-5874-48BB-A94D-7E555BE6EC01}"/>
+                  </a:ext>
+                </a:extLst>
+              </p:cNvPr>
+              <p:cNvSpPr>
+                <a:spLocks noGrp="1" noRot="1" noChangeAspect="1" noMove="1" noResize="1" noEditPoints="1" noAdjustHandles="1" noChangeArrowheads="1" noChangeShapeType="1" noTextEdit="1"/>
+              </p:cNvSpPr>
+              <p:nvPr>
+                <p:ph idx="1"/>
+              </p:nvPr>
+            </p:nvSpPr>
+            <p:spPr>
+              <a:xfrm>
+                <a:off x="696913" y="908720"/>
+                <a:ext cx="10798175" cy="5256584"/>
+              </a:xfrm>
+              <a:blipFill>
+                <a:blip r:embed="rId3"/>
+                <a:stretch>
+                  <a:fillRect l="-1354" t="-1508"/>
+                </a:stretch>
+              </a:blipFill>
+            </p:spPr>
+            <p:txBody>
+              <a:bodyPr/>
+              <a:lstStyle/>
+              <a:p>
+                <a:r>
+                  <a:rPr lang="en-GB">
+                    <a:noFill/>
+                  </a:rPr>
+                  <a:t> </a:t>
+                </a:r>
+              </a:p>
+            </p:txBody>
+          </p:sp>
+        </mc:Fallback>
+      </mc:AlternateContent>
+    </p:spTree>
+    <p:extLst>
+      <p:ext uri="{BB962C8B-B14F-4D97-AF65-F5344CB8AC3E}">
+        <p14:creationId xmlns:p14="http://schemas.microsoft.com/office/powerpoint/2010/main" val="1553846302"/>
       </p:ext>
     </p:extLst>
   </p:cSld>
@@ -20469,8 +21184,8 @@
           </a:p>
         </p:txBody>
       </p:sp>
-      <mc:AlternateContent xmlns:mc="http://schemas.openxmlformats.org/markup-compatibility/2006" xmlns:a14="http://schemas.microsoft.com/office/drawing/2010/main">
-        <mc:Choice Requires="a14">
+      <mc:AlternateContent xmlns:mc="http://schemas.openxmlformats.org/markup-compatibility/2006">
+        <mc:Choice xmlns:a14="http://schemas.microsoft.com/office/drawing/2010/main" Requires="a14">
           <p:sp>
             <p:nvSpPr>
               <p:cNvPr id="3" name="Content Placeholder 2">
@@ -21032,7 +21747,7 @@
                 </a:r>
                 <a:r>
                   <a:rPr lang="en-GB" baseline="-25000" dirty="0"/>
-                  <a:t>1</a:t>
+                  <a:t>2</a:t>
                 </a:r>
                 <a:r>
                   <a:rPr lang="en-GB" dirty="0"/>
@@ -21192,7 +21907,7 @@
             </p:txBody>
           </p:sp>
         </mc:Choice>
-        <mc:Fallback xmlns="">
+        <mc:Fallback>
           <p:sp>
             <p:nvSpPr>
               <p:cNvPr id="3" name="Content Placeholder 2">
@@ -21271,7 +21986,7 @@
           <p:cNvPr id="2" name="Title 1">
             <a:extLst>
               <a:ext uri="{FF2B5EF4-FFF2-40B4-BE49-F238E27FC236}">
-                <a16:creationId xmlns:a16="http://schemas.microsoft.com/office/drawing/2014/main" id="{78FEEEAD-80C1-4393-89D7-B4F4543E4551}"/>
+                <a16:creationId xmlns:a16="http://schemas.microsoft.com/office/drawing/2014/main" id="{51381CBB-FB1E-4B9B-923D-E9909EFB905A}"/>
               </a:ext>
             </a:extLst>
           </p:cNvPr>
@@ -21284,7 +21999,7 @@
         </p:nvSpPr>
         <p:spPr>
           <a:xfrm>
-            <a:off x="696912" y="116632"/>
+            <a:off x="696913" y="116632"/>
             <a:ext cx="10798175" cy="533400"/>
           </a:xfrm>
         </p:spPr>
@@ -21294,203 +22009,282 @@
           <a:p>
             <a:pPr algn="ctr"/>
             <a:r>
-              <a:rPr lang="en-GB" b="0" dirty="0"/>
-              <a:t>Implementation in R</a:t>
-            </a:r>
-            <a:endParaRPr lang="en-GB" dirty="0"/>
+              <a:rPr lang="en-GB" dirty="0"/>
+              <a:t>Beta distribution</a:t>
+            </a:r>
           </a:p>
         </p:txBody>
       </p:sp>
-      <p:sp>
-        <p:nvSpPr>
-          <p:cNvPr id="3" name="Content Placeholder 2">
+      <p:pic>
+        <p:nvPicPr>
+          <p:cNvPr id="4" name="Picture 3">
             <a:extLst>
               <a:ext uri="{FF2B5EF4-FFF2-40B4-BE49-F238E27FC236}">
-                <a16:creationId xmlns:a16="http://schemas.microsoft.com/office/drawing/2014/main" id="{38FC01DC-960B-4FC5-8DA0-762FBF5E96DE}"/>
+                <a16:creationId xmlns:a16="http://schemas.microsoft.com/office/drawing/2014/main" id="{2DA97E49-2C4E-4663-9C3E-71F8B084712B}"/>
               </a:ext>
             </a:extLst>
           </p:cNvPr>
-          <p:cNvSpPr>
-            <a:spLocks noGrp="1"/>
-          </p:cNvSpPr>
-          <p:nvPr>
-            <p:ph idx="1"/>
-          </p:nvPr>
-        </p:nvSpPr>
+          <p:cNvPicPr>
+            <a:picLocks noChangeAspect="1"/>
+          </p:cNvPicPr>
+          <p:nvPr/>
+        </p:nvPicPr>
+        <p:blipFill>
+          <a:blip r:embed="rId2"/>
+          <a:stretch>
+            <a:fillRect/>
+          </a:stretch>
+        </p:blipFill>
         <p:spPr>
           <a:xfrm>
-            <a:off x="696913" y="650032"/>
-            <a:ext cx="10798173" cy="5290393"/>
+            <a:off x="696912" y="838910"/>
+            <a:ext cx="10798175" cy="4721967"/>
           </a:xfrm>
+          <a:prstGeom prst="rect">
+            <a:avLst/>
+          </a:prstGeom>
+        </p:spPr>
+      </p:pic>
+      <p:sp>
+        <p:nvSpPr>
+          <p:cNvPr id="6" name="Content Placeholder 2">
+            <a:extLst>
+              <a:ext uri="{FF2B5EF4-FFF2-40B4-BE49-F238E27FC236}">
+                <a16:creationId xmlns:a16="http://schemas.microsoft.com/office/drawing/2014/main" id="{86B400F3-5531-4E08-A6D6-93A35EDCA9C8}"/>
+              </a:ext>
+            </a:extLst>
+          </p:cNvPr>
+          <p:cNvSpPr txBox="1">
+            <a:spLocks/>
+          </p:cNvSpPr>
+          <p:nvPr/>
+        </p:nvSpPr>
+        <p:spPr bwMode="auto">
+          <a:xfrm>
+            <a:off x="701240" y="5749756"/>
+            <a:ext cx="10798175" cy="432048"/>
+          </a:xfrm>
+          <a:prstGeom prst="rect">
+            <a:avLst/>
+          </a:prstGeom>
+          <a:noFill/>
+          <a:ln>
+            <a:noFill/>
+          </a:ln>
+          <a:extLst>
+            <a:ext uri="{909E8E84-426E-40DD-AFC4-6F175D3DCCD1}">
+              <a14:hiddenFill xmlns:a14="http://schemas.microsoft.com/office/drawing/2010/main">
+                <a:solidFill>
+                  <a:srgbClr val="FFFFFF"/>
+                </a:solidFill>
+              </a14:hiddenFill>
+            </a:ext>
+            <a:ext uri="{91240B29-F687-4F45-9708-019B960494DF}">
+              <a14:hiddenLine xmlns:a14="http://schemas.microsoft.com/office/drawing/2010/main" w="9525">
+                <a:solidFill>
+                  <a:srgbClr val="000000"/>
+                </a:solidFill>
+                <a:miter lim="800000"/>
+                <a:headEnd/>
+                <a:tailEnd/>
+              </a14:hiddenLine>
+            </a:ext>
+          </a:extLst>
         </p:spPr>
         <p:txBody>
-          <a:bodyPr/>
-          <a:lstStyle/>
-          <a:p>
-            <a:r>
-              <a:rPr lang="en-GB" dirty="0"/>
-              <a:t>The function used is </a:t>
-            </a:r>
-            <a:r>
-              <a:rPr lang="en-GB" dirty="0" err="1"/>
-              <a:t>betareg</a:t>
-            </a:r>
-            <a:r>
-              <a:rPr lang="en-GB" dirty="0"/>
-              <a:t>()</a:t>
-            </a:r>
-          </a:p>
-          <a:p>
-            <a:r>
-              <a:rPr lang="en-GB" dirty="0"/>
-              <a:t>Similar to the </a:t>
-            </a:r>
-            <a:r>
-              <a:rPr lang="en-GB" dirty="0" err="1"/>
-              <a:t>glm</a:t>
-            </a:r>
-            <a:r>
-              <a:rPr lang="en-GB" dirty="0"/>
-              <a:t>() function.</a:t>
-            </a:r>
-          </a:p>
-          <a:p>
-            <a:pPr lvl="1"/>
-            <a:r>
-              <a:rPr lang="en-GB" dirty="0"/>
-              <a:t>A main difference is that two equations may be calculated (one for mean and  one for precision) </a:t>
-            </a:r>
-          </a:p>
-          <a:p>
-            <a:pPr marL="321945" lvl="1" indent="0" algn="ctr">
+          <a:bodyPr vert="horz" wrap="square" lIns="0" tIns="0" rIns="0" bIns="0" numCol="1" anchor="t" anchorCtr="0" compatLnSpc="1"/>
+          <a:lstStyle>
+            <a:lvl1pPr marL="322580" indent="-322580" algn="l" rtl="0" eaLnBrk="0" fontAlgn="base" hangingPunct="0">
+              <a:lnSpc>
+                <a:spcPts val="2500"/>
+              </a:lnSpc>
+              <a:spcBef>
+                <a:spcPct val="0"/>
+              </a:spcBef>
+              <a:spcAft>
+                <a:spcPct val="0"/>
+              </a:spcAft>
+              <a:buClr>
+                <a:schemeClr val="tx2"/>
+              </a:buClr>
+              <a:buFont typeface="Arial" charset="0"/>
+              <a:buChar char="•"/>
+              <a:defRPr sz="2000" kern="1200">
+                <a:solidFill>
+                  <a:schemeClr val="tx1"/>
+                </a:solidFill>
+                <a:latin typeface="+mn-lt"/>
+                <a:ea typeface="+mn-ea"/>
+                <a:cs typeface="+mn-cs"/>
+              </a:defRPr>
+            </a:lvl1pPr>
+            <a:lvl2pPr marL="647700" indent="-325755" algn="l" rtl="0" eaLnBrk="0" fontAlgn="base" hangingPunct="0">
+              <a:lnSpc>
+                <a:spcPts val="2500"/>
+              </a:lnSpc>
+              <a:spcBef>
+                <a:spcPct val="0"/>
+              </a:spcBef>
+              <a:spcAft>
+                <a:spcPct val="0"/>
+              </a:spcAft>
+              <a:buFont typeface="Arial" charset="0"/>
+              <a:buChar char="•"/>
+              <a:defRPr sz="2000" kern="1200">
+                <a:solidFill>
+                  <a:schemeClr val="tx1"/>
+                </a:solidFill>
+                <a:latin typeface="+mn-lt"/>
+                <a:ea typeface="+mn-ea"/>
+                <a:cs typeface="+mn-cs"/>
+              </a:defRPr>
+            </a:lvl2pPr>
+            <a:lvl3pPr marL="970280" indent="-323850" algn="l" rtl="0" eaLnBrk="0" fontAlgn="base" hangingPunct="0">
+              <a:lnSpc>
+                <a:spcPts val="2500"/>
+              </a:lnSpc>
+              <a:spcBef>
+                <a:spcPct val="0"/>
+              </a:spcBef>
+              <a:spcAft>
+                <a:spcPct val="0"/>
+              </a:spcAft>
+              <a:buClr>
+                <a:schemeClr val="tx2"/>
+              </a:buClr>
+              <a:buFont typeface="Arial" charset="0"/>
+              <a:buChar char="•"/>
+              <a:defRPr sz="2000" kern="1200">
+                <a:solidFill>
+                  <a:schemeClr val="tx1"/>
+                </a:solidFill>
+                <a:latin typeface="+mn-lt"/>
+                <a:ea typeface="+mn-ea"/>
+                <a:cs typeface="+mn-cs"/>
+              </a:defRPr>
+            </a:lvl3pPr>
+            <a:lvl4pPr marL="1294130" indent="-322580" algn="l" rtl="0" eaLnBrk="0" fontAlgn="base" hangingPunct="0">
+              <a:lnSpc>
+                <a:spcPts val="2500"/>
+              </a:lnSpc>
+              <a:spcBef>
+                <a:spcPct val="0"/>
+              </a:spcBef>
+              <a:spcAft>
+                <a:spcPct val="0"/>
+              </a:spcAft>
+              <a:buFont typeface="Arial" charset="0"/>
+              <a:buChar char="•"/>
+              <a:defRPr sz="2000" kern="1200">
+                <a:solidFill>
+                  <a:schemeClr val="tx1"/>
+                </a:solidFill>
+                <a:latin typeface="+mn-lt"/>
+                <a:ea typeface="+mn-ea"/>
+                <a:cs typeface="+mn-cs"/>
+              </a:defRPr>
+            </a:lvl4pPr>
+            <a:lvl5pPr marL="1619250" indent="-323850" algn="l" rtl="0" eaLnBrk="0" fontAlgn="base" hangingPunct="0">
+              <a:lnSpc>
+                <a:spcPts val="2500"/>
+              </a:lnSpc>
+              <a:spcBef>
+                <a:spcPct val="0"/>
+              </a:spcBef>
+              <a:spcAft>
+                <a:spcPct val="0"/>
+              </a:spcAft>
+              <a:buClr>
+                <a:schemeClr val="tx2"/>
+              </a:buClr>
+              <a:buFont typeface="Arial" charset="0"/>
+              <a:buChar char="•"/>
+              <a:defRPr sz="2000" kern="1200">
+                <a:solidFill>
+                  <a:schemeClr val="tx1"/>
+                </a:solidFill>
+                <a:latin typeface="+mn-lt"/>
+                <a:ea typeface="+mn-ea"/>
+                <a:cs typeface="+mn-cs"/>
+              </a:defRPr>
+            </a:lvl5pPr>
+            <a:lvl6pPr marL="2514600" indent="-228600" algn="l" defTabSz="914400" rtl="0" eaLnBrk="1" latinLnBrk="0" hangingPunct="1">
+              <a:spcBef>
+                <a:spcPct val="20000"/>
+              </a:spcBef>
+              <a:buFont typeface="Arial" charset="0"/>
+              <a:buChar char="•"/>
+              <a:defRPr sz="2000" kern="1200">
+                <a:solidFill>
+                  <a:schemeClr val="tx1"/>
+                </a:solidFill>
+                <a:latin typeface="+mn-lt"/>
+                <a:ea typeface="+mn-ea"/>
+                <a:cs typeface="+mn-cs"/>
+              </a:defRPr>
+            </a:lvl6pPr>
+            <a:lvl7pPr marL="2971800" indent="-228600" algn="l" defTabSz="914400" rtl="0" eaLnBrk="1" latinLnBrk="0" hangingPunct="1">
+              <a:spcBef>
+                <a:spcPct val="20000"/>
+              </a:spcBef>
+              <a:buFont typeface="Arial" charset="0"/>
+              <a:buChar char="•"/>
+              <a:defRPr sz="2000" kern="1200">
+                <a:solidFill>
+                  <a:schemeClr val="tx1"/>
+                </a:solidFill>
+                <a:latin typeface="+mn-lt"/>
+                <a:ea typeface="+mn-ea"/>
+                <a:cs typeface="+mn-cs"/>
+              </a:defRPr>
+            </a:lvl7pPr>
+            <a:lvl8pPr marL="3429000" indent="-228600" algn="l" defTabSz="914400" rtl="0" eaLnBrk="1" latinLnBrk="0" hangingPunct="1">
+              <a:spcBef>
+                <a:spcPct val="20000"/>
+              </a:spcBef>
+              <a:buFont typeface="Arial" charset="0"/>
+              <a:buChar char="•"/>
+              <a:defRPr sz="2000" kern="1200">
+                <a:solidFill>
+                  <a:schemeClr val="tx1"/>
+                </a:solidFill>
+                <a:latin typeface="+mn-lt"/>
+                <a:ea typeface="+mn-ea"/>
+                <a:cs typeface="+mn-cs"/>
+              </a:defRPr>
+            </a:lvl8pPr>
+            <a:lvl9pPr marL="3886200" indent="-228600" algn="l" defTabSz="914400" rtl="0" eaLnBrk="1" latinLnBrk="0" hangingPunct="1">
+              <a:spcBef>
+                <a:spcPct val="20000"/>
+              </a:spcBef>
+              <a:buFont typeface="Arial" charset="0"/>
+              <a:buChar char="•"/>
+              <a:defRPr sz="2000" kern="1200">
+                <a:solidFill>
+                  <a:schemeClr val="tx1"/>
+                </a:solidFill>
+                <a:latin typeface="+mn-lt"/>
+                <a:ea typeface="+mn-ea"/>
+                <a:cs typeface="+mn-cs"/>
+              </a:defRPr>
+            </a:lvl9pPr>
+          </a:lstStyle>
+          <a:p>
+            <a:pPr marL="0" indent="0">
+              <a:buFont typeface="Arial" charset="0"/>
               <a:buNone/>
             </a:pPr>
             <a:r>
               <a:rPr lang="en-GB" dirty="0"/>
-              <a:t>formula = </a:t>
-            </a:r>
-            <a:r>
-              <a:rPr lang="pl-PL" dirty="0"/>
-              <a:t>y ~ x1 + x2 | </a:t>
-            </a:r>
-            <a:r>
-              <a:rPr lang="en-GB" dirty="0"/>
-              <a:t>1 + </a:t>
-            </a:r>
-            <a:r>
-              <a:rPr lang="pl-PL" dirty="0"/>
-              <a:t>z1 + z2 + z3</a:t>
-            </a:r>
-            <a:endParaRPr lang="en-GB" dirty="0"/>
-          </a:p>
-          <a:p>
-            <a:pPr marL="321945" lvl="1" indent="0" algn="ctr">
-              <a:buNone/>
-            </a:pPr>
-            <a:r>
-              <a:rPr lang="en-GB" dirty="0"/>
-              <a:t>In the above example the x</a:t>
-            </a:r>
-            <a:r>
-              <a:rPr lang="en-GB" baseline="-25000" dirty="0"/>
-              <a:t>1</a:t>
-            </a:r>
-            <a:r>
-              <a:rPr lang="en-GB" dirty="0"/>
-              <a:t> + x</a:t>
-            </a:r>
-            <a:r>
-              <a:rPr lang="en-GB" baseline="-25000" dirty="0"/>
-              <a:t>2</a:t>
-            </a:r>
-            <a:r>
-              <a:rPr lang="en-GB" dirty="0"/>
-              <a:t> are the regressors for mean  modelling </a:t>
-            </a:r>
-            <a:r>
-              <a:rPr lang="en-GB" dirty="0">
-                <a:hlinkClick r:id="rId3" action="ppaction://hlinksldjump"/>
-              </a:rPr>
-              <a:t>[eq.1]</a:t>
-            </a:r>
-            <a:endParaRPr lang="en-GB" dirty="0"/>
-          </a:p>
-          <a:p>
-            <a:pPr marL="321945" lvl="1" indent="0" algn="ctr">
-              <a:buNone/>
-            </a:pPr>
-            <a:r>
-              <a:rPr lang="en-GB" dirty="0"/>
-              <a:t>While the </a:t>
-            </a:r>
-            <a:r>
-              <a:rPr lang="pl-PL" dirty="0"/>
-              <a:t>z</a:t>
-            </a:r>
-            <a:r>
-              <a:rPr lang="pl-PL" baseline="-25000" dirty="0"/>
-              <a:t>1</a:t>
-            </a:r>
-            <a:r>
-              <a:rPr lang="pl-PL" dirty="0"/>
-              <a:t> + z</a:t>
-            </a:r>
-            <a:r>
-              <a:rPr lang="pl-PL" baseline="-25000" dirty="0"/>
-              <a:t>2</a:t>
-            </a:r>
-            <a:r>
-              <a:rPr lang="pl-PL" dirty="0"/>
-              <a:t> + z</a:t>
-            </a:r>
-            <a:r>
-              <a:rPr lang="pl-PL" baseline="-25000" dirty="0"/>
-              <a:t>3</a:t>
-            </a:r>
-            <a:r>
-              <a:rPr lang="en-GB" dirty="0"/>
-              <a:t> are the regressors for the precision equation </a:t>
-            </a:r>
-            <a:r>
-              <a:rPr lang="en-GB" dirty="0">
-                <a:hlinkClick r:id="rId3" action="ppaction://hlinksldjump"/>
-              </a:rPr>
-              <a:t>[eq.2]</a:t>
-            </a:r>
-            <a:endParaRPr lang="en-GB" dirty="0"/>
-          </a:p>
-          <a:p>
-            <a:pPr marL="321945" lvl="1" indent="0" algn="ctr">
-              <a:buNone/>
-            </a:pPr>
-            <a:endParaRPr lang="en-GB" baseline="-25000" dirty="0"/>
-          </a:p>
-          <a:p>
-            <a:pPr marL="321945" lvl="1" indent="0" algn="ctr">
-              <a:buNone/>
-            </a:pPr>
-            <a:r>
-              <a:rPr lang="en-GB" dirty="0"/>
-              <a:t>formula = </a:t>
-            </a:r>
-            <a:r>
-              <a:rPr lang="pl-PL" dirty="0"/>
-              <a:t>y ~ x1 + x2</a:t>
-            </a:r>
-            <a:endParaRPr lang="en-GB" dirty="0"/>
-          </a:p>
-          <a:p>
-            <a:pPr marL="321945" lvl="1" indent="0" algn="ctr">
-              <a:buNone/>
-            </a:pPr>
-            <a:endParaRPr lang="en-GB" dirty="0"/>
+              <a:t>Probability density functions for beta distributions with varying parameters</a:t>
+            </a:r>
           </a:p>
         </p:txBody>
       </p:sp>
     </p:spTree>
     <p:extLst>
       <p:ext uri="{BB962C8B-B14F-4D97-AF65-F5344CB8AC3E}">
-        <p14:creationId xmlns:p14="http://schemas.microsoft.com/office/powerpoint/2010/main" val="2928120243"/>
+        <p14:creationId xmlns:p14="http://schemas.microsoft.com/office/powerpoint/2010/main" val="1175052142"/>
       </p:ext>
     </p:extLst>
   </p:cSld>

</xml_diff>